<commit_message>
Background Worker - Verified if project can connect to a Google API Updated Architecture slide in powerpoint - Using Cloud Sql Admin API that has direct access to the database.
</commit_message>
<xml_diff>
--- a/Indreica_Claudia-Nicoleta/Proiect_Datc/ProiectDATC.pptx
+++ b/Indreica_Claudia-Nicoleta/Proiect_Datc/ProiectDATC.pptx
@@ -3813,51 +3813,6 @@
           </a:fontRef>
         </p:style>
       </p:cxnSp>
-      <p:sp>
-        <p:nvSpPr>
-          <p:cNvPr id="42" name="TextBox 41"/>
-          <p:cNvSpPr txBox="1"/>
-          <p:nvPr/>
-        </p:nvSpPr>
-        <p:spPr>
-          <a:xfrm>
-            <a:off x="6422501" y="2317818"/>
-            <a:ext cx="1143000" cy="738664"/>
-          </a:xfrm>
-          <a:prstGeom prst="rect">
-            <a:avLst/>
-          </a:prstGeom>
-          <a:noFill/>
-          <a:ln>
-            <a:noFill/>
-          </a:ln>
-        </p:spPr>
-        <p:txBody>
-          <a:bodyPr wrap="square" rtlCol="0">
-            <a:spAutoFit/>
-          </a:bodyPr>
-          <a:lstStyle>
-            <a:defPPr>
-              <a:defRPr lang="en-US"/>
-            </a:defPPr>
-            <a:lvl1pPr algn="ctr">
-              <a:defRPr sz="1400"/>
-            </a:lvl1pPr>
-          </a:lstStyle>
-          <a:p>
-            <a:r>
-              <a:rPr lang="en-US" b="1" dirty="0"/>
-              <a:t>Cloud Database</a:t>
-            </a:r>
-          </a:p>
-          <a:p>
-            <a:r>
-              <a:rPr lang="en-US" b="1" dirty="0"/>
-              <a:t>API</a:t>
-            </a:r>
-          </a:p>
-        </p:txBody>
-      </p:sp>
       <p:pic>
         <p:nvPicPr>
           <p:cNvPr id="41" name="Picture 40"/>
@@ -4239,10 +4194,58 @@
           <a:lstStyle/>
           <a:p>
             <a:r>
-              <a:rPr lang="en-US" sz="4400" dirty="0" err="1" smtClean="0"/>
+              <a:rPr lang="en-US" sz="4400" noProof="1" smtClean="0"/>
               <a:t>Arhitectura</a:t>
             </a:r>
-            <a:endParaRPr lang="en-US" sz="4400" dirty="0"/>
+            <a:endParaRPr lang="en-US" sz="4400" noProof="1"/>
+          </a:p>
+        </p:txBody>
+      </p:sp>
+      <p:sp>
+        <p:nvSpPr>
+          <p:cNvPr id="22" name="TextBox 21"/>
+          <p:cNvSpPr txBox="1"/>
+          <p:nvPr/>
+        </p:nvSpPr>
+        <p:spPr>
+          <a:xfrm>
+            <a:off x="6409752" y="2396138"/>
+            <a:ext cx="1371600" cy="523220"/>
+          </a:xfrm>
+          <a:prstGeom prst="rect">
+            <a:avLst/>
+          </a:prstGeom>
+          <a:noFill/>
+          <a:ln>
+            <a:noFill/>
+          </a:ln>
+        </p:spPr>
+        <p:txBody>
+          <a:bodyPr wrap="square" rtlCol="0">
+            <a:spAutoFit/>
+          </a:bodyPr>
+          <a:lstStyle>
+            <a:defPPr>
+              <a:defRPr lang="en-US"/>
+            </a:defPPr>
+            <a:lvl1pPr algn="ctr">
+              <a:defRPr sz="1400" b="1"/>
+            </a:lvl1pPr>
+          </a:lstStyle>
+          <a:p>
+            <a:r>
+              <a:rPr lang="en-US" dirty="0" smtClean="0"/>
+              <a:t>Cloud </a:t>
+            </a:r>
+            <a:r>
+              <a:rPr lang="en-US" noProof="1" smtClean="0"/>
+              <a:t>Sql </a:t>
+            </a:r>
+            <a:r>
+              <a:rPr lang="en-US" dirty="0" smtClean="0"/>
+              <a:t>Admin API</a:t>
+            </a:r>
+            <a:endParaRPr lang="en-US" dirty="0"/>
           </a:p>
         </p:txBody>
       </p:sp>
@@ -4419,11 +4422,7 @@
             </a:r>
             <a:r>
               <a:rPr lang="en-US" b="1" dirty="0" smtClean="0"/>
-              <a:t> </a:t>
-            </a:r>
-            <a:r>
-              <a:rPr lang="en-US" b="1" dirty="0" smtClean="0"/>
-              <a:t>Date</a:t>
+              <a:t> Date</a:t>
             </a:r>
           </a:p>
           <a:p>
@@ -6949,11 +6948,7 @@
             </a:r>
             <a:r>
               <a:rPr lang="en-US" sz="1600" i="1" dirty="0" smtClean="0"/>
-              <a:t> Background </a:t>
-            </a:r>
-            <a:r>
-              <a:rPr lang="en-US" sz="1600" i="1" dirty="0" smtClean="0"/>
-              <a:t>Worker</a:t>
+              <a:t> Background Worker</a:t>
             </a:r>
           </a:p>
           <a:p>

</xml_diff>

<commit_message>
Updated Architecture Created Data Generator as a Windows Forms Application Updated some data about Background Worker
</commit_message>
<xml_diff>
--- a/Indreica_Claudia-Nicoleta/Proiect_Datc/ProiectDATC.pptx
+++ b/Indreica_Claudia-Nicoleta/Proiect_Datc/ProiectDATC.pptx
@@ -7,10 +7,13 @@
   <p:sldIdLst>
     <p:sldId id="256" r:id="rId2"/>
     <p:sldId id="261" r:id="rId3"/>
-    <p:sldId id="257" r:id="rId4"/>
-    <p:sldId id="258" r:id="rId5"/>
-    <p:sldId id="259" r:id="rId6"/>
-    <p:sldId id="260" r:id="rId7"/>
+    <p:sldId id="262" r:id="rId4"/>
+    <p:sldId id="264" r:id="rId5"/>
+    <p:sldId id="266" r:id="rId6"/>
+    <p:sldId id="257" r:id="rId7"/>
+    <p:sldId id="258" r:id="rId8"/>
+    <p:sldId id="259" r:id="rId9"/>
+    <p:sldId id="260" r:id="rId10"/>
   </p:sldIdLst>
   <p:sldSz cx="9144000" cy="6858000" type="screen4x3"/>
   <p:notesSz cx="6858000" cy="9144000"/>
@@ -304,7 +307,7 @@
           <a:p>
             <a:fld id="{39D22919-619C-471F-88C8-E19CCC00B3AF}" type="datetimeFigureOut">
               <a:rPr lang="en-US" smtClean="0"/>
-              <a:t>18-Nov-18</a:t>
+              <a:t>19-Nov-18</a:t>
             </a:fld>
             <a:endParaRPr lang="en-US"/>
           </a:p>
@@ -469,7 +472,7 @@
           <a:p>
             <a:fld id="{39D22919-619C-471F-88C8-E19CCC00B3AF}" type="datetimeFigureOut">
               <a:rPr lang="en-US" smtClean="0"/>
-              <a:t>18-Nov-18</a:t>
+              <a:t>19-Nov-18</a:t>
             </a:fld>
             <a:endParaRPr lang="en-US"/>
           </a:p>
@@ -644,7 +647,7 @@
           <a:p>
             <a:fld id="{39D22919-619C-471F-88C8-E19CCC00B3AF}" type="datetimeFigureOut">
               <a:rPr lang="en-US" smtClean="0"/>
-              <a:t>18-Nov-18</a:t>
+              <a:t>19-Nov-18</a:t>
             </a:fld>
             <a:endParaRPr lang="en-US"/>
           </a:p>
@@ -827,7 +830,7 @@
           <a:p>
             <a:fld id="{39D22919-619C-471F-88C8-E19CCC00B3AF}" type="datetimeFigureOut">
               <a:rPr lang="en-US" smtClean="0"/>
-              <a:t>18-Nov-18</a:t>
+              <a:t>19-Nov-18</a:t>
             </a:fld>
             <a:endParaRPr lang="en-US"/>
           </a:p>
@@ -1089,7 +1092,7 @@
           <a:p>
             <a:fld id="{39D22919-619C-471F-88C8-E19CCC00B3AF}" type="datetimeFigureOut">
               <a:rPr lang="en-US" smtClean="0"/>
-              <a:t>18-Nov-18</a:t>
+              <a:t>19-Nov-18</a:t>
             </a:fld>
             <a:endParaRPr lang="en-US"/>
           </a:p>
@@ -1437,7 +1440,7 @@
           <a:p>
             <a:fld id="{39D22919-619C-471F-88C8-E19CCC00B3AF}" type="datetimeFigureOut">
               <a:rPr lang="en-US" smtClean="0"/>
-              <a:t>18-Nov-18</a:t>
+              <a:t>19-Nov-18</a:t>
             </a:fld>
             <a:endParaRPr lang="en-US"/>
           </a:p>
@@ -1745,7 +1748,7 @@
           <a:p>
             <a:fld id="{39D22919-619C-471F-88C8-E19CCC00B3AF}" type="datetimeFigureOut">
               <a:rPr lang="en-US" smtClean="0"/>
-              <a:t>18-Nov-18</a:t>
+              <a:t>19-Nov-18</a:t>
             </a:fld>
             <a:endParaRPr lang="en-US"/>
           </a:p>
@@ -1972,7 +1975,7 @@
           <a:p>
             <a:fld id="{39D22919-619C-471F-88C8-E19CCC00B3AF}" type="datetimeFigureOut">
               <a:rPr lang="en-US" smtClean="0"/>
-              <a:t>18-Nov-18</a:t>
+              <a:t>19-Nov-18</a:t>
             </a:fld>
             <a:endParaRPr lang="en-US"/>
           </a:p>
@@ -2062,7 +2065,7 @@
           <a:p>
             <a:fld id="{39D22919-619C-471F-88C8-E19CCC00B3AF}" type="datetimeFigureOut">
               <a:rPr lang="en-US" smtClean="0"/>
-              <a:t>18-Nov-18</a:t>
+              <a:t>19-Nov-18</a:t>
             </a:fld>
             <a:endParaRPr lang="en-US"/>
           </a:p>
@@ -2350,7 +2353,7 @@
           <a:p>
             <a:fld id="{39D22919-619C-471F-88C8-E19CCC00B3AF}" type="datetimeFigureOut">
               <a:rPr lang="en-US" smtClean="0"/>
-              <a:t>18-Nov-18</a:t>
+              <a:t>19-Nov-18</a:t>
             </a:fld>
             <a:endParaRPr lang="en-US"/>
           </a:p>
@@ -2619,7 +2622,7 @@
           <a:p>
             <a:fld id="{39D22919-619C-471F-88C8-E19CCC00B3AF}" type="datetimeFigureOut">
               <a:rPr lang="en-US" smtClean="0"/>
-              <a:t>18-Nov-18</a:t>
+              <a:t>19-Nov-18</a:t>
             </a:fld>
             <a:endParaRPr lang="en-US"/>
           </a:p>
@@ -2829,7 +2832,7 @@
           <a:p>
             <a:fld id="{39D22919-619C-471F-88C8-E19CCC00B3AF}" type="datetimeFigureOut">
               <a:rPr lang="en-US" smtClean="0"/>
-              <a:t>18-Nov-18</a:t>
+              <a:t>19-Nov-18</a:t>
             </a:fld>
             <a:endParaRPr lang="en-US"/>
           </a:p>
@@ -3561,8 +3564,8 @@
         </p:nvSpPr>
         <p:spPr>
           <a:xfrm>
-            <a:off x="1236351" y="5764074"/>
-            <a:ext cx="838200" cy="338554"/>
+            <a:off x="1089729" y="5779016"/>
+            <a:ext cx="2326567" cy="338554"/>
           </a:xfrm>
           <a:prstGeom prst="rect">
             <a:avLst/>
@@ -3583,48 +3586,13 @@
           <a:lstStyle/>
           <a:p>
             <a:r>
-              <a:rPr lang="en-US" sz="1600" i="1" dirty="0" smtClean="0"/>
-              <a:t>Queue</a:t>
-            </a:r>
-            <a:endParaRPr lang="en-US" sz="1600" i="1" dirty="0"/>
-          </a:p>
-        </p:txBody>
-      </p:sp>
-      <p:cxnSp>
-        <p:nvCxnSpPr>
-          <p:cNvPr id="15" name="Elbow Connector 14"/>
-          <p:cNvCxnSpPr/>
-          <p:nvPr/>
-        </p:nvCxnSpPr>
-        <p:spPr>
-          <a:xfrm rot="5400000">
-            <a:off x="4308551" y="3749105"/>
-            <a:ext cx="2824708" cy="959008"/>
-          </a:xfrm>
-          <a:prstGeom prst="bentConnector3">
-            <a:avLst>
-              <a:gd name="adj1" fmla="val 50000"/>
-            </a:avLst>
-          </a:prstGeom>
-          <a:ln w="25400">
-            <a:tailEnd type="arrow" w="lg" len="lg"/>
-          </a:ln>
-        </p:spPr>
-        <p:style>
-          <a:lnRef idx="1">
-            <a:schemeClr val="accent1"/>
-          </a:lnRef>
-          <a:fillRef idx="0">
-            <a:schemeClr val="accent1"/>
-          </a:fillRef>
-          <a:effectRef idx="0">
-            <a:schemeClr val="accent1"/>
-          </a:effectRef>
-          <a:fontRef idx="minor">
-            <a:schemeClr val="tx1"/>
-          </a:fontRef>
-        </p:style>
-      </p:cxnSp>
+              <a:rPr lang="en-US" sz="1600" b="1" i="1" dirty="0" smtClean="0"/>
+              <a:t>Queue – Cloud AMQP </a:t>
+            </a:r>
+            <a:endParaRPr lang="en-US" sz="1600" b="1" i="1" dirty="0"/>
+          </a:p>
+        </p:txBody>
+      </p:sp>
       <p:cxnSp>
         <p:nvCxnSpPr>
           <p:cNvPr id="25" name="Elbow Connector 24"/>
@@ -4049,7 +4017,7 @@
         </p:blipFill>
         <p:spPr>
           <a:xfrm>
-            <a:off x="3292157" y="3497177"/>
+            <a:off x="3292158" y="3536557"/>
             <a:ext cx="920543" cy="920543"/>
           </a:xfrm>
           <a:prstGeom prst="rect">
@@ -4105,7 +4073,7 @@
         <p:spPr>
           <a:xfrm>
             <a:off x="5373771" y="5933351"/>
-            <a:ext cx="1371600" cy="523220"/>
+            <a:ext cx="1371600" cy="707886"/>
           </a:xfrm>
           <a:prstGeom prst="rect">
             <a:avLst/>
@@ -4135,9 +4103,16 @@
           </a:p>
           <a:p>
             <a:r>
-              <a:rPr lang="en-US" dirty="0"/>
+              <a:rPr lang="en-US" dirty="0" smtClean="0"/>
               <a:t>App</a:t>
             </a:r>
+          </a:p>
+          <a:p>
+            <a:r>
+              <a:rPr lang="en-US" sz="1200" b="0" dirty="0" smtClean="0"/>
+              <a:t>Windows Forms</a:t>
+            </a:r>
+            <a:endParaRPr lang="en-US" sz="1200" b="0" dirty="0"/>
           </a:p>
         </p:txBody>
       </p:sp>
@@ -4249,6 +4224,194 @@
           </a:p>
         </p:txBody>
       </p:sp>
+      <p:sp>
+        <p:nvSpPr>
+          <p:cNvPr id="23" name="TextBox 22"/>
+          <p:cNvSpPr txBox="1"/>
+          <p:nvPr/>
+        </p:nvSpPr>
+        <p:spPr>
+          <a:xfrm>
+            <a:off x="2863847" y="2392248"/>
+            <a:ext cx="1022353" cy="323165"/>
+          </a:xfrm>
+          <a:prstGeom prst="rect">
+            <a:avLst/>
+          </a:prstGeom>
+          <a:noFill/>
+          <a:ln>
+            <a:solidFill>
+              <a:schemeClr val="accent6">
+                <a:lumMod val="50000"/>
+              </a:schemeClr>
+            </a:solidFill>
+          </a:ln>
+        </p:spPr>
+        <p:txBody>
+          <a:bodyPr wrap="square" rtlCol="0">
+            <a:spAutoFit/>
+          </a:bodyPr>
+          <a:lstStyle/>
+          <a:p>
+            <a:r>
+              <a:rPr lang="en-US" sz="1500" b="1" i="1" dirty="0" smtClean="0"/>
+              <a:t>API_KEY</a:t>
+            </a:r>
+            <a:endParaRPr lang="en-US" sz="1500" b="1" i="1" dirty="0"/>
+          </a:p>
+        </p:txBody>
+      </p:sp>
+      <p:sp>
+        <p:nvSpPr>
+          <p:cNvPr id="24" name="TextBox 23"/>
+          <p:cNvSpPr txBox="1"/>
+          <p:nvPr/>
+        </p:nvSpPr>
+        <p:spPr>
+          <a:xfrm>
+            <a:off x="4486690" y="3988461"/>
+            <a:ext cx="999710" cy="323165"/>
+          </a:xfrm>
+          <a:prstGeom prst="rect">
+            <a:avLst/>
+          </a:prstGeom>
+          <a:noFill/>
+          <a:ln>
+            <a:solidFill>
+              <a:schemeClr val="accent6">
+                <a:lumMod val="50000"/>
+              </a:schemeClr>
+            </a:solidFill>
+          </a:ln>
+        </p:spPr>
+        <p:txBody>
+          <a:bodyPr wrap="square" rtlCol="0">
+            <a:spAutoFit/>
+          </a:bodyPr>
+          <a:lstStyle/>
+          <a:p>
+            <a:r>
+              <a:rPr lang="en-US" sz="1500" b="1" i="1" dirty="0" smtClean="0"/>
+              <a:t>API_KEY</a:t>
+            </a:r>
+            <a:endParaRPr lang="en-US" sz="1500" b="1" i="1" dirty="0"/>
+          </a:p>
+        </p:txBody>
+      </p:sp>
+      <p:sp>
+        <p:nvSpPr>
+          <p:cNvPr id="2" name="Rectangle 1"/>
+          <p:cNvSpPr/>
+          <p:nvPr/>
+        </p:nvSpPr>
+        <p:spPr>
+          <a:xfrm>
+            <a:off x="5736701" y="898093"/>
+            <a:ext cx="3386827" cy="2516880"/>
+          </a:xfrm>
+          <a:prstGeom prst="rect">
+            <a:avLst/>
+          </a:prstGeom>
+          <a:noFill/>
+          <a:ln>
+            <a:solidFill>
+              <a:srgbClr val="FFC000"/>
+            </a:solidFill>
+          </a:ln>
+        </p:spPr>
+        <p:style>
+          <a:lnRef idx="2">
+            <a:schemeClr val="accent1">
+              <a:shade val="50000"/>
+            </a:schemeClr>
+          </a:lnRef>
+          <a:fillRef idx="1">
+            <a:schemeClr val="accent1"/>
+          </a:fillRef>
+          <a:effectRef idx="0">
+            <a:schemeClr val="accent1"/>
+          </a:effectRef>
+          <a:fontRef idx="minor">
+            <a:schemeClr val="lt1"/>
+          </a:fontRef>
+        </p:style>
+        <p:txBody>
+          <a:bodyPr rtlCol="0" anchor="ctr"/>
+          <a:lstStyle/>
+          <a:p>
+            <a:pPr algn="ctr"/>
+            <a:endParaRPr lang="en-US"/>
+          </a:p>
+        </p:txBody>
+      </p:sp>
+      <p:sp>
+        <p:nvSpPr>
+          <p:cNvPr id="3" name="TextBox 2"/>
+          <p:cNvSpPr txBox="1"/>
+          <p:nvPr/>
+        </p:nvSpPr>
+        <p:spPr>
+          <a:xfrm>
+            <a:off x="6747499" y="3114598"/>
+            <a:ext cx="1484229" cy="307777"/>
+          </a:xfrm>
+          <a:prstGeom prst="rect">
+            <a:avLst/>
+          </a:prstGeom>
+          <a:noFill/>
+        </p:spPr>
+        <p:txBody>
+          <a:bodyPr wrap="square" rtlCol="0">
+            <a:spAutoFit/>
+          </a:bodyPr>
+          <a:lstStyle/>
+          <a:p>
+            <a:r>
+              <a:rPr lang="en-US" sz="1400" dirty="0" smtClean="0"/>
+              <a:t>Google Platform</a:t>
+            </a:r>
+            <a:endParaRPr lang="en-US" sz="1400" dirty="0"/>
+          </a:p>
+        </p:txBody>
+      </p:sp>
+      <p:cxnSp>
+        <p:nvCxnSpPr>
+          <p:cNvPr id="5" name="Elbow Connector 4"/>
+          <p:cNvCxnSpPr>
+            <a:stCxn id="41" idx="2"/>
+            <a:endCxn id="62" idx="0"/>
+          </p:cNvCxnSpPr>
+          <p:nvPr/>
+        </p:nvCxnSpPr>
+        <p:spPr>
+          <a:xfrm rot="5400000">
+            <a:off x="4261167" y="3688642"/>
+            <a:ext cx="2771928" cy="1132715"/>
+          </a:xfrm>
+          <a:prstGeom prst="bentConnector3">
+            <a:avLst>
+              <a:gd name="adj1" fmla="val 84465"/>
+            </a:avLst>
+          </a:prstGeom>
+          <a:ln w="25400">
+            <a:tailEnd type="arrow" w="lg" len="lg"/>
+          </a:ln>
+        </p:spPr>
+        <p:style>
+          <a:lnRef idx="1">
+            <a:schemeClr val="accent1"/>
+          </a:lnRef>
+          <a:fillRef idx="0">
+            <a:schemeClr val="accent1"/>
+          </a:fillRef>
+          <a:effectRef idx="0">
+            <a:schemeClr val="accent1"/>
+          </a:effectRef>
+          <a:fontRef idx="minor">
+            <a:schemeClr val="tx1"/>
+          </a:fontRef>
+        </p:style>
+      </p:cxnSp>
     </p:spTree>
     <p:extLst>
       <p:ext uri="{BB962C8B-B14F-4D97-AF65-F5344CB8AC3E}">
@@ -4288,24 +4451,19 @@
       </p:grpSpPr>
       <p:sp>
         <p:nvSpPr>
-          <p:cNvPr id="6" name="TextBox 5"/>
+          <p:cNvPr id="4" name="TextBox 3"/>
           <p:cNvSpPr txBox="1"/>
           <p:nvPr/>
         </p:nvSpPr>
         <p:spPr>
           <a:xfrm>
-            <a:off x="388702" y="1246559"/>
-            <a:ext cx="2451480" cy="861774"/>
+            <a:off x="1066800" y="304800"/>
+            <a:ext cx="3200400" cy="584775"/>
           </a:xfrm>
           <a:prstGeom prst="rect">
             <a:avLst/>
           </a:prstGeom>
           <a:noFill/>
-          <a:ln w="38100">
-            <a:solidFill>
-              <a:schemeClr val="tx1"/>
-            </a:solidFill>
-          </a:ln>
         </p:spPr>
         <p:txBody>
           <a:bodyPr wrap="square" rtlCol="0">
@@ -4314,347 +4472,403 @@
           <a:lstStyle/>
           <a:p>
             <a:r>
-              <a:rPr lang="en-US" sz="1600" i="1" dirty="0" smtClean="0"/>
-              <a:t>In Cloud Azure – web job</a:t>
-            </a:r>
-          </a:p>
-          <a:p>
-            <a:r>
-              <a:rPr lang="en-US" b="1" dirty="0" smtClean="0"/>
-              <a:t>Background Worker</a:t>
-            </a:r>
-          </a:p>
-          <a:p>
-            <a:r>
-              <a:rPr lang="en-US" sz="1600" dirty="0" err="1" smtClean="0"/>
-              <a:t>Indreica</a:t>
-            </a:r>
-            <a:r>
-              <a:rPr lang="en-US" sz="1600" dirty="0" smtClean="0"/>
-              <a:t> Claudia</a:t>
-            </a:r>
-            <a:endParaRPr lang="en-US" sz="1600" dirty="0"/>
-          </a:p>
-        </p:txBody>
-      </p:sp>
-      <p:sp>
-        <p:nvSpPr>
-          <p:cNvPr id="7" name="TextBox 6"/>
-          <p:cNvSpPr txBox="1"/>
+              <a:rPr lang="en-US" sz="3200" b="1" noProof="1" smtClean="0"/>
+              <a:t>Baza de Date</a:t>
+            </a:r>
+            <a:endParaRPr lang="en-US" sz="3200" b="1" noProof="1"/>
+          </a:p>
+        </p:txBody>
+      </p:sp>
+      <p:graphicFrame>
+        <p:nvGraphicFramePr>
+          <p:cNvPr id="5" name="Table 4"/>
+          <p:cNvGraphicFramePr>
+            <a:graphicFrameLocks noGrp="1"/>
+          </p:cNvGraphicFramePr>
+          <p:nvPr>
+            <p:extLst>
+              <p:ext uri="{D42A27DB-BD31-4B8C-83A1-F6EECF244321}">
+                <p14:modId xmlns:p14="http://schemas.microsoft.com/office/powerpoint/2010/main" val="2541957079"/>
+              </p:ext>
+            </p:extLst>
+          </p:nvPr>
+        </p:nvGraphicFramePr>
+        <p:xfrm>
+          <a:off x="892792" y="1981200"/>
+          <a:ext cx="4038600" cy="767080"/>
+        </p:xfrm>
+        <a:graphic>
+          <a:graphicData uri="http://schemas.openxmlformats.org/drawingml/2006/table">
+            <a:tbl>
+              <a:tblPr firstRow="1" bandRow="1">
+                <a:tableStyleId>{5C22544A-7EE6-4342-B048-85BDC9FD1C3A}</a:tableStyleId>
+              </a:tblPr>
+              <a:tblGrid>
+                <a:gridCol w="2019300"/>
+                <a:gridCol w="2019300"/>
+              </a:tblGrid>
+              <a:tr h="396240">
+                <a:tc>
+                  <a:txBody>
+                    <a:bodyPr/>
+                    <a:lstStyle/>
+                    <a:p>
+                      <a:r>
+                        <a:rPr lang="en-US" dirty="0" smtClean="0"/>
+                        <a:t>Grad</a:t>
+                      </a:r>
+                      <a:endParaRPr lang="en-US" dirty="0"/>
+                    </a:p>
+                  </a:txBody>
+                  <a:tcPr/>
+                </a:tc>
+                <a:tc>
+                  <a:txBody>
+                    <a:bodyPr/>
+                    <a:lstStyle/>
+                    <a:p>
+                      <a:r>
+                        <a:rPr lang="en-US" dirty="0" smtClean="0"/>
+                        <a:t>Interval</a:t>
+                      </a:r>
+                      <a:endParaRPr lang="en-US" dirty="0"/>
+                    </a:p>
+                  </a:txBody>
+                  <a:tcPr/>
+                </a:tc>
+              </a:tr>
+              <a:tr h="370840">
+                <a:tc>
+                  <a:txBody>
+                    <a:bodyPr/>
+                    <a:lstStyle/>
+                    <a:p>
+                      <a:r>
+                        <a:rPr lang="en-US" noProof="1" smtClean="0"/>
+                        <a:t>Primary key</a:t>
+                      </a:r>
+                      <a:endParaRPr lang="en-US" noProof="1"/>
+                    </a:p>
+                  </a:txBody>
+                  <a:tcPr/>
+                </a:tc>
+                <a:tc>
+                  <a:txBody>
+                    <a:bodyPr/>
+                    <a:lstStyle/>
+                    <a:p>
+                      <a:r>
+                        <a:rPr lang="en-US" noProof="1" smtClean="0"/>
+                        <a:t>Int value</a:t>
+                      </a:r>
+                      <a:endParaRPr lang="en-US" noProof="1"/>
+                    </a:p>
+                  </a:txBody>
+                  <a:tcPr/>
+                </a:tc>
+              </a:tr>
+            </a:tbl>
+          </a:graphicData>
+        </a:graphic>
+      </p:graphicFrame>
+      <p:graphicFrame>
+        <p:nvGraphicFramePr>
+          <p:cNvPr id="6" name="Table 5"/>
+          <p:cNvGraphicFramePr>
+            <a:graphicFrameLocks noGrp="1"/>
+          </p:cNvGraphicFramePr>
+          <p:nvPr>
+            <p:extLst>
+              <p:ext uri="{D42A27DB-BD31-4B8C-83A1-F6EECF244321}">
+                <p14:modId xmlns:p14="http://schemas.microsoft.com/office/powerpoint/2010/main" val="1790959322"/>
+              </p:ext>
+            </p:extLst>
+          </p:nvPr>
+        </p:nvGraphicFramePr>
+        <p:xfrm>
+          <a:off x="865496" y="3733800"/>
+          <a:ext cx="4038600" cy="2595880"/>
+        </p:xfrm>
+        <a:graphic>
+          <a:graphicData uri="http://schemas.openxmlformats.org/drawingml/2006/table">
+            <a:tbl>
+              <a:tblPr firstRow="1" bandRow="1">
+                <a:tableStyleId>{5C22544A-7EE6-4342-B048-85BDC9FD1C3A}</a:tableStyleId>
+              </a:tblPr>
+              <a:tblGrid>
+                <a:gridCol w="2019300"/>
+                <a:gridCol w="2019300"/>
+              </a:tblGrid>
+              <a:tr h="370840">
+                <a:tc>
+                  <a:txBody>
+                    <a:bodyPr/>
+                    <a:lstStyle/>
+                    <a:p>
+                      <a:r>
+                        <a:rPr lang="en-US" dirty="0" smtClean="0"/>
+                        <a:t>Grad</a:t>
+                      </a:r>
+                      <a:endParaRPr lang="en-US" dirty="0"/>
+                    </a:p>
+                  </a:txBody>
+                  <a:tcPr/>
+                </a:tc>
+                <a:tc>
+                  <a:txBody>
+                    <a:bodyPr/>
+                    <a:lstStyle/>
+                    <a:p>
+                      <a:r>
+                        <a:rPr lang="en-US" dirty="0" smtClean="0"/>
+                        <a:t>Interval</a:t>
+                      </a:r>
+                      <a:endParaRPr lang="en-US" dirty="0"/>
+                    </a:p>
+                  </a:txBody>
+                  <a:tcPr/>
+                </a:tc>
+              </a:tr>
+              <a:tr h="370840">
+                <a:tc>
+                  <a:txBody>
+                    <a:bodyPr/>
+                    <a:lstStyle/>
+                    <a:p>
+                      <a:r>
+                        <a:rPr lang="en-US" i="1" noProof="1" smtClean="0"/>
+                        <a:t>Primary key</a:t>
+                      </a:r>
+                      <a:endParaRPr lang="en-US" i="1" noProof="1"/>
+                    </a:p>
+                  </a:txBody>
+                  <a:tcPr/>
+                </a:tc>
+                <a:tc>
+                  <a:txBody>
+                    <a:bodyPr/>
+                    <a:lstStyle/>
+                    <a:p>
+                      <a:r>
+                        <a:rPr lang="en-US" i="1" noProof="1" smtClean="0"/>
+                        <a:t>Int value</a:t>
+                      </a:r>
+                      <a:endParaRPr lang="en-US" i="1" noProof="1"/>
+                    </a:p>
+                  </a:txBody>
+                  <a:tcPr/>
+                </a:tc>
+              </a:tr>
+              <a:tr h="370840">
+                <a:tc>
+                  <a:txBody>
+                    <a:bodyPr/>
+                    <a:lstStyle/>
+                    <a:p>
+                      <a:r>
+                        <a:rPr lang="en-US" dirty="0" smtClean="0"/>
+                        <a:t>1</a:t>
+                      </a:r>
+                      <a:endParaRPr lang="en-US" dirty="0"/>
+                    </a:p>
+                  </a:txBody>
+                  <a:tcPr/>
+                </a:tc>
+                <a:tc>
+                  <a:txBody>
+                    <a:bodyPr/>
+                    <a:lstStyle/>
+                    <a:p>
+                      <a:r>
+                        <a:rPr lang="en-US" dirty="0" smtClean="0"/>
+                        <a:t>0 – 19</a:t>
+                      </a:r>
+                      <a:endParaRPr lang="en-US" dirty="0"/>
+                    </a:p>
+                  </a:txBody>
+                  <a:tcPr/>
+                </a:tc>
+              </a:tr>
+              <a:tr h="370840">
+                <a:tc>
+                  <a:txBody>
+                    <a:bodyPr/>
+                    <a:lstStyle/>
+                    <a:p>
+                      <a:r>
+                        <a:rPr lang="en-US" dirty="0" smtClean="0"/>
+                        <a:t>2</a:t>
+                      </a:r>
+                      <a:endParaRPr lang="en-US" dirty="0"/>
+                    </a:p>
+                  </a:txBody>
+                  <a:tcPr/>
+                </a:tc>
+                <a:tc>
+                  <a:txBody>
+                    <a:bodyPr/>
+                    <a:lstStyle/>
+                    <a:p>
+                      <a:r>
+                        <a:rPr lang="en-US" dirty="0" smtClean="0"/>
+                        <a:t>20 – 39</a:t>
+                      </a:r>
+                      <a:endParaRPr lang="en-US" dirty="0"/>
+                    </a:p>
+                  </a:txBody>
+                  <a:tcPr/>
+                </a:tc>
+              </a:tr>
+              <a:tr h="370840">
+                <a:tc>
+                  <a:txBody>
+                    <a:bodyPr/>
+                    <a:lstStyle/>
+                    <a:p>
+                      <a:r>
+                        <a:rPr lang="en-US" dirty="0" smtClean="0"/>
+                        <a:t>3</a:t>
+                      </a:r>
+                      <a:endParaRPr lang="en-US" dirty="0"/>
+                    </a:p>
+                  </a:txBody>
+                  <a:tcPr/>
+                </a:tc>
+                <a:tc>
+                  <a:txBody>
+                    <a:bodyPr/>
+                    <a:lstStyle/>
+                    <a:p>
+                      <a:r>
+                        <a:rPr lang="en-US" dirty="0" smtClean="0"/>
+                        <a:t>40 – 59</a:t>
+                      </a:r>
+                      <a:endParaRPr lang="en-US" dirty="0"/>
+                    </a:p>
+                  </a:txBody>
+                  <a:tcPr/>
+                </a:tc>
+              </a:tr>
+              <a:tr h="370840">
+                <a:tc>
+                  <a:txBody>
+                    <a:bodyPr/>
+                    <a:lstStyle/>
+                    <a:p>
+                      <a:r>
+                        <a:rPr lang="en-US" dirty="0" smtClean="0"/>
+                        <a:t>4</a:t>
+                      </a:r>
+                      <a:endParaRPr lang="en-US" dirty="0"/>
+                    </a:p>
+                  </a:txBody>
+                  <a:tcPr/>
+                </a:tc>
+                <a:tc>
+                  <a:txBody>
+                    <a:bodyPr/>
+                    <a:lstStyle/>
+                    <a:p>
+                      <a:r>
+                        <a:rPr lang="en-US" dirty="0" smtClean="0"/>
+                        <a:t>60 – 79</a:t>
+                      </a:r>
+                      <a:endParaRPr lang="en-US" dirty="0"/>
+                    </a:p>
+                  </a:txBody>
+                  <a:tcPr/>
+                </a:tc>
+              </a:tr>
+              <a:tr h="370840">
+                <a:tc>
+                  <a:txBody>
+                    <a:bodyPr/>
+                    <a:lstStyle/>
+                    <a:p>
+                      <a:r>
+                        <a:rPr lang="en-US" dirty="0" smtClean="0"/>
+                        <a:t>5</a:t>
+                      </a:r>
+                      <a:endParaRPr lang="en-US" dirty="0"/>
+                    </a:p>
+                  </a:txBody>
+                  <a:tcPr/>
+                </a:tc>
+                <a:tc>
+                  <a:txBody>
+                    <a:bodyPr/>
+                    <a:lstStyle/>
+                    <a:p>
+                      <a:r>
+                        <a:rPr lang="en-US" dirty="0" smtClean="0"/>
+                        <a:t>80 - 100</a:t>
+                      </a:r>
+                      <a:endParaRPr lang="en-US" dirty="0"/>
+                    </a:p>
+                  </a:txBody>
+                  <a:tcPr/>
+                </a:tc>
+              </a:tr>
+            </a:tbl>
+          </a:graphicData>
+        </a:graphic>
+      </p:graphicFrame>
+      <p:sp>
+        <p:nvSpPr>
+          <p:cNvPr id="7" name="Rectangle 6"/>
+          <p:cNvSpPr/>
           <p:nvPr/>
         </p:nvSpPr>
         <p:spPr>
           <a:xfrm>
-            <a:off x="3525982" y="1246559"/>
-            <a:ext cx="2286000" cy="923330"/>
+            <a:off x="2922896" y="4495800"/>
+            <a:ext cx="3532496" cy="1828800"/>
           </a:xfrm>
           <a:prstGeom prst="rect">
             <a:avLst/>
           </a:prstGeom>
           <a:noFill/>
-          <a:ln w="38100">
+          <a:ln>
             <a:solidFill>
-              <a:schemeClr val="tx1"/>
+              <a:srgbClr val="FF0000"/>
             </a:solidFill>
           </a:ln>
         </p:spPr>
-        <p:txBody>
-          <a:bodyPr wrap="square" rtlCol="0">
-            <a:spAutoFit/>
-          </a:bodyPr>
-          <a:lstStyle/>
-          <a:p>
-            <a:endParaRPr lang="en-US" b="1" dirty="0" smtClean="0"/>
-          </a:p>
-          <a:p>
-            <a:r>
-              <a:rPr lang="en-US" b="1" dirty="0" err="1" smtClean="0"/>
-              <a:t>Aplicatie</a:t>
-            </a:r>
-            <a:r>
-              <a:rPr lang="en-US" b="1" dirty="0" smtClean="0"/>
-              <a:t> Web/Mobile</a:t>
-            </a:r>
-          </a:p>
-          <a:p>
-            <a:r>
-              <a:rPr lang="en-US" sz="1600" dirty="0"/>
-              <a:t>Adrian </a:t>
-            </a:r>
-            <a:r>
-              <a:rPr lang="en-US" sz="1600" dirty="0" err="1" smtClean="0"/>
-              <a:t>Ioncsov</a:t>
-            </a:r>
-            <a:endParaRPr lang="en-US" sz="1600" dirty="0"/>
-          </a:p>
-        </p:txBody>
-      </p:sp>
-      <p:sp>
-        <p:nvSpPr>
-          <p:cNvPr id="8" name="TextBox 7"/>
-          <p:cNvSpPr txBox="1"/>
-          <p:nvPr/>
-        </p:nvSpPr>
-        <p:spPr>
-          <a:xfrm>
-            <a:off x="6481962" y="1558949"/>
-            <a:ext cx="2026693" cy="615553"/>
-          </a:xfrm>
-          <a:prstGeom prst="rect">
-            <a:avLst/>
-          </a:prstGeom>
-          <a:noFill/>
-          <a:ln w="38100">
-            <a:solidFill>
-              <a:schemeClr val="tx1"/>
-            </a:solidFill>
-          </a:ln>
-        </p:spPr>
-        <p:txBody>
-          <a:bodyPr wrap="square" rtlCol="0">
-            <a:spAutoFit/>
-          </a:bodyPr>
-          <a:lstStyle/>
-          <a:p>
-            <a:r>
-              <a:rPr lang="en-US" b="1" dirty="0" err="1" smtClean="0"/>
-              <a:t>Generare</a:t>
-            </a:r>
-            <a:r>
-              <a:rPr lang="en-US" b="1" dirty="0" smtClean="0"/>
-              <a:t> Date</a:t>
-            </a:r>
-          </a:p>
-          <a:p>
-            <a:r>
-              <a:rPr lang="en-US" sz="1600" dirty="0"/>
-              <a:t>Dan Marcel</a:t>
-            </a:r>
-          </a:p>
-        </p:txBody>
-      </p:sp>
-      <p:sp>
-        <p:nvSpPr>
-          <p:cNvPr id="11" name="TextBox 10"/>
-          <p:cNvSpPr txBox="1"/>
-          <p:nvPr/>
-        </p:nvSpPr>
-        <p:spPr>
-          <a:xfrm>
-            <a:off x="6096000" y="3271119"/>
-            <a:ext cx="3200400" cy="1169551"/>
-          </a:xfrm>
-          <a:prstGeom prst="rect">
-            <a:avLst/>
-          </a:prstGeom>
-          <a:noFill/>
-        </p:spPr>
-        <p:txBody>
-          <a:bodyPr wrap="square" rtlCol="0">
-            <a:spAutoFit/>
-          </a:bodyPr>
-          <a:lstStyle/>
-          <a:p>
-            <a:pPr>
-              <a:spcBef>
-                <a:spcPts val="600"/>
-              </a:spcBef>
-              <a:spcAft>
-                <a:spcPts val="600"/>
-              </a:spcAft>
-            </a:pPr>
-            <a:r>
-              <a:rPr lang="en-US" b="1" dirty="0" err="1" smtClean="0"/>
-              <a:t>Lista</a:t>
-            </a:r>
-            <a:r>
-              <a:rPr lang="en-US" b="1" dirty="0" smtClean="0"/>
-              <a:t> Task-</a:t>
-            </a:r>
-            <a:r>
-              <a:rPr lang="en-US" b="1" dirty="0" err="1" smtClean="0"/>
-              <a:t>uri</a:t>
-            </a:r>
-            <a:r>
-              <a:rPr lang="en-US" b="1" dirty="0" smtClean="0"/>
-              <a:t>:</a:t>
-            </a:r>
-          </a:p>
-          <a:p>
-            <a:pPr>
-              <a:spcBef>
-                <a:spcPts val="600"/>
-              </a:spcBef>
-              <a:spcAft>
-                <a:spcPts val="600"/>
-              </a:spcAft>
-            </a:pPr>
-            <a:r>
-              <a:rPr lang="en-US" sz="1600" b="1" dirty="0" smtClean="0"/>
-              <a:t>- </a:t>
-            </a:r>
-            <a:r>
-              <a:rPr lang="en-US" sz="1600" b="1" dirty="0" err="1" smtClean="0"/>
-              <a:t>GenerateRandom</a:t>
-            </a:r>
-            <a:r>
-              <a:rPr lang="en-US" sz="1600" b="1" i="1" dirty="0" smtClean="0"/>
-              <a:t>(</a:t>
-            </a:r>
-            <a:r>
-              <a:rPr lang="en-US" sz="1600" b="1" i="1" dirty="0" err="1" smtClean="0"/>
-              <a:t>minVal,maxVal</a:t>
-            </a:r>
-            <a:r>
-              <a:rPr lang="en-US" sz="1600" b="1" i="1" dirty="0" smtClean="0"/>
-              <a:t>)</a:t>
-            </a:r>
-          </a:p>
-          <a:p>
-            <a:pPr>
-              <a:spcBef>
-                <a:spcPts val="600"/>
-              </a:spcBef>
-              <a:spcAft>
-                <a:spcPts val="600"/>
-              </a:spcAft>
-            </a:pPr>
-            <a:r>
-              <a:rPr lang="en-US" sz="1600" b="1" dirty="0" smtClean="0"/>
-              <a:t>- </a:t>
-            </a:r>
-            <a:r>
-              <a:rPr lang="en-US" sz="1600" b="1" dirty="0" err="1" smtClean="0"/>
-              <a:t>UploadValuesToCloud</a:t>
-            </a:r>
-            <a:r>
-              <a:rPr lang="en-US" sz="1600" b="1" dirty="0" smtClean="0"/>
-              <a:t>()</a:t>
-            </a:r>
-            <a:endParaRPr lang="en-US" sz="1600" b="1" dirty="0"/>
-          </a:p>
-        </p:txBody>
-      </p:sp>
-      <p:cxnSp>
-        <p:nvCxnSpPr>
-          <p:cNvPr id="13" name="Straight Arrow Connector 12"/>
-          <p:cNvCxnSpPr>
-            <a:stCxn id="6" idx="2"/>
-          </p:cNvCxnSpPr>
-          <p:nvPr/>
-        </p:nvCxnSpPr>
-        <p:spPr>
-          <a:xfrm>
-            <a:off x="1614442" y="2108333"/>
-            <a:ext cx="0" cy="890826"/>
-          </a:xfrm>
-          <a:prstGeom prst="straightConnector1">
-            <a:avLst/>
-          </a:prstGeom>
-          <a:ln w="22225">
-            <a:solidFill>
-              <a:schemeClr val="tx1"/>
-            </a:solidFill>
-            <a:tailEnd type="arrow"/>
-          </a:ln>
-        </p:spPr>
         <p:style>
-          <a:lnRef idx="1">
-            <a:schemeClr val="accent1"/>
+          <a:lnRef idx="2">
+            <a:schemeClr val="accent1">
+              <a:shade val="50000"/>
+            </a:schemeClr>
           </a:lnRef>
-          <a:fillRef idx="0">
+          <a:fillRef idx="1">
             <a:schemeClr val="accent1"/>
           </a:fillRef>
           <a:effectRef idx="0">
             <a:schemeClr val="accent1"/>
           </a:effectRef>
           <a:fontRef idx="minor">
-            <a:schemeClr val="tx1"/>
+            <a:schemeClr val="lt1"/>
           </a:fontRef>
         </p:style>
-      </p:cxnSp>
-      <p:cxnSp>
-        <p:nvCxnSpPr>
-          <p:cNvPr id="14" name="Straight Arrow Connector 13"/>
-          <p:cNvCxnSpPr/>
-          <p:nvPr/>
-        </p:nvCxnSpPr>
-        <p:spPr>
-          <a:xfrm>
-            <a:off x="4637809" y="2169889"/>
-            <a:ext cx="0" cy="917138"/>
-          </a:xfrm>
-          <a:prstGeom prst="straightConnector1">
-            <a:avLst/>
-          </a:prstGeom>
-          <a:ln w="22225">
-            <a:solidFill>
-              <a:schemeClr val="tx1"/>
-            </a:solidFill>
-            <a:tailEnd type="arrow"/>
-          </a:ln>
-        </p:spPr>
-        <p:style>
-          <a:lnRef idx="1">
-            <a:schemeClr val="accent1"/>
-          </a:lnRef>
-          <a:fillRef idx="0">
-            <a:schemeClr val="accent1"/>
-          </a:fillRef>
-          <a:effectRef idx="0">
-            <a:schemeClr val="accent1"/>
-          </a:effectRef>
-          <a:fontRef idx="minor">
-            <a:schemeClr val="tx1"/>
-          </a:fontRef>
-        </p:style>
-      </p:cxnSp>
-      <p:cxnSp>
-        <p:nvCxnSpPr>
-          <p:cNvPr id="15" name="Straight Arrow Connector 14"/>
-          <p:cNvCxnSpPr/>
-          <p:nvPr/>
-        </p:nvCxnSpPr>
-        <p:spPr>
-          <a:xfrm>
-            <a:off x="7495309" y="2185811"/>
-            <a:ext cx="0" cy="901216"/>
-          </a:xfrm>
-          <a:prstGeom prst="straightConnector1">
-            <a:avLst/>
-          </a:prstGeom>
-          <a:ln w="22225">
-            <a:solidFill>
-              <a:schemeClr val="tx1"/>
-            </a:solidFill>
-            <a:tailEnd type="arrow"/>
-          </a:ln>
-        </p:spPr>
-        <p:style>
-          <a:lnRef idx="1">
-            <a:schemeClr val="accent1"/>
-          </a:lnRef>
-          <a:fillRef idx="0">
-            <a:schemeClr val="accent1"/>
-          </a:fillRef>
-          <a:effectRef idx="0">
-            <a:schemeClr val="accent1"/>
-          </a:effectRef>
-          <a:fontRef idx="minor">
-            <a:schemeClr val="tx1"/>
-          </a:fontRef>
-        </p:style>
-      </p:cxnSp>
-      <p:sp>
-        <p:nvSpPr>
-          <p:cNvPr id="16" name="TextBox 15"/>
+        <p:txBody>
+          <a:bodyPr rtlCol="0" anchor="ctr"/>
+          <a:lstStyle/>
+          <a:p>
+            <a:pPr algn="ctr"/>
+            <a:endParaRPr lang="en-US"/>
+          </a:p>
+        </p:txBody>
+      </p:sp>
+      <p:sp>
+        <p:nvSpPr>
+          <p:cNvPr id="8" name="TextBox 7"/>
           <p:cNvSpPr txBox="1"/>
           <p:nvPr/>
         </p:nvSpPr>
         <p:spPr>
           <a:xfrm>
-            <a:off x="3413077" y="3091935"/>
-            <a:ext cx="2819401" cy="3313728"/>
+            <a:off x="4931392" y="4902368"/>
+            <a:ext cx="1524000" cy="646331"/>
           </a:xfrm>
           <a:prstGeom prst="rect">
             <a:avLst/>
@@ -4667,244 +4881,30 @@
           </a:bodyPr>
           <a:lstStyle/>
           <a:p>
-            <a:pPr>
-              <a:spcBef>
-                <a:spcPts val="200"/>
-              </a:spcBef>
-              <a:spcAft>
-                <a:spcPts val="200"/>
-              </a:spcAft>
-            </a:pPr>
-            <a:r>
-              <a:rPr lang="en-US" b="1" dirty="0" err="1" smtClean="0"/>
-              <a:t>Lista</a:t>
-            </a:r>
-            <a:r>
-              <a:rPr lang="en-US" b="1" dirty="0" smtClean="0"/>
-              <a:t> Task-</a:t>
-            </a:r>
-            <a:r>
-              <a:rPr lang="en-US" b="1" dirty="0" err="1" smtClean="0"/>
-              <a:t>uri</a:t>
-            </a:r>
-            <a:r>
-              <a:rPr lang="en-US" b="1" dirty="0" smtClean="0"/>
-              <a:t>:</a:t>
-            </a:r>
-          </a:p>
-          <a:p>
-            <a:pPr>
-              <a:spcBef>
-                <a:spcPts val="200"/>
-              </a:spcBef>
-              <a:spcAft>
-                <a:spcPts val="200"/>
-              </a:spcAft>
-            </a:pPr>
-            <a:endParaRPr lang="en-US" sz="1600" b="1" dirty="0" smtClean="0"/>
-          </a:p>
-          <a:p>
-            <a:pPr>
-              <a:spcBef>
-                <a:spcPts val="200"/>
-              </a:spcBef>
-              <a:spcAft>
-                <a:spcPts val="200"/>
-              </a:spcAft>
-            </a:pPr>
-            <a:r>
-              <a:rPr lang="en-US" sz="1600" b="1" dirty="0" smtClean="0"/>
-              <a:t>-     </a:t>
-            </a:r>
-            <a:r>
-              <a:rPr lang="en-US" sz="1600" b="1" dirty="0" err="1" smtClean="0"/>
-              <a:t>SetFlagArea</a:t>
-            </a:r>
-            <a:r>
-              <a:rPr lang="en-US" sz="1600" b="1" dirty="0" smtClean="0"/>
-              <a:t>()</a:t>
-            </a:r>
-            <a:endParaRPr lang="en-US" sz="1600" i="1" dirty="0" smtClean="0"/>
-          </a:p>
-          <a:p>
-            <a:pPr marL="285750" indent="-285750">
-              <a:spcBef>
-                <a:spcPts val="200"/>
-              </a:spcBef>
-              <a:spcAft>
-                <a:spcPts val="200"/>
-              </a:spcAft>
-              <a:buFontTx/>
-              <a:buChar char="-"/>
-            </a:pPr>
-            <a:r>
-              <a:rPr lang="en-US" sz="1600" b="1" dirty="0" err="1" smtClean="0"/>
-              <a:t>HeatMapDisplay</a:t>
-            </a:r>
-            <a:r>
-              <a:rPr lang="en-US" sz="1600" b="1" dirty="0" smtClean="0"/>
-              <a:t>()</a:t>
-            </a:r>
-          </a:p>
-          <a:p>
-            <a:pPr marL="285750" indent="-285750">
-              <a:spcBef>
-                <a:spcPts val="200"/>
-              </a:spcBef>
-              <a:spcAft>
-                <a:spcPts val="200"/>
-              </a:spcAft>
-              <a:buFontTx/>
-              <a:buChar char="-"/>
-            </a:pPr>
-            <a:r>
-              <a:rPr lang="en-US" sz="1600" b="1" dirty="0" err="1" smtClean="0"/>
-              <a:t>SetHumidityTreshold</a:t>
-            </a:r>
-            <a:r>
-              <a:rPr lang="en-US" sz="1600" b="1" dirty="0" smtClean="0"/>
-              <a:t>() </a:t>
-            </a:r>
-          </a:p>
-          <a:p>
-            <a:pPr marL="285750" indent="-285750">
-              <a:spcBef>
-                <a:spcPts val="200"/>
-              </a:spcBef>
-              <a:spcAft>
-                <a:spcPts val="200"/>
-              </a:spcAft>
-              <a:buFontTx/>
-              <a:buChar char="-"/>
-            </a:pPr>
-            <a:r>
-              <a:rPr lang="en-US" sz="1600" b="1" dirty="0" smtClean="0"/>
-              <a:t>Irrigate(</a:t>
-            </a:r>
-            <a:r>
-              <a:rPr lang="en-US" sz="1600" b="1" i="1" dirty="0" smtClean="0"/>
-              <a:t>area</a:t>
-            </a:r>
-            <a:r>
-              <a:rPr lang="en-US" sz="1600" b="1" dirty="0" smtClean="0"/>
-              <a:t>) </a:t>
-            </a:r>
-          </a:p>
-          <a:p>
-            <a:pPr marL="285750" indent="-285750">
-              <a:spcBef>
-                <a:spcPts val="200"/>
-              </a:spcBef>
-              <a:spcAft>
-                <a:spcPts val="200"/>
-              </a:spcAft>
-              <a:buFontTx/>
-              <a:buChar char="-"/>
-            </a:pPr>
-            <a:r>
-              <a:rPr lang="en-US" sz="1600" b="1" dirty="0" err="1" smtClean="0"/>
-              <a:t>StopIrigation</a:t>
-            </a:r>
-            <a:r>
-              <a:rPr lang="en-US" sz="1600" b="1" dirty="0" smtClean="0"/>
-              <a:t>(area) </a:t>
-            </a:r>
-          </a:p>
-          <a:p>
-            <a:pPr marL="285750" indent="-285750">
-              <a:spcBef>
-                <a:spcPts val="200"/>
-              </a:spcBef>
-              <a:spcAft>
-                <a:spcPts val="200"/>
-              </a:spcAft>
-              <a:buFontTx/>
-              <a:buChar char="-"/>
-            </a:pPr>
-            <a:r>
-              <a:rPr lang="en-US" sz="1600" b="1" dirty="0" err="1" smtClean="0"/>
-              <a:t>DelimitAreas</a:t>
-            </a:r>
-            <a:r>
-              <a:rPr lang="en-US" sz="1600" b="1" dirty="0"/>
-              <a:t>() </a:t>
-            </a:r>
-            <a:endParaRPr lang="en-US" sz="1600" b="1" dirty="0" smtClean="0"/>
-          </a:p>
-          <a:p>
-            <a:pPr marL="285750" indent="-285750">
-              <a:spcBef>
-                <a:spcPts val="200"/>
-              </a:spcBef>
-              <a:spcAft>
-                <a:spcPts val="200"/>
-              </a:spcAft>
-              <a:buFontTx/>
-              <a:buChar char="-"/>
-            </a:pPr>
-            <a:r>
-              <a:rPr lang="en-US" sz="1600" b="1" dirty="0" err="1" smtClean="0"/>
-              <a:t>EraseArea</a:t>
-            </a:r>
-            <a:r>
-              <a:rPr lang="en-US" sz="1600" b="1" dirty="0" smtClean="0"/>
-              <a:t>()</a:t>
-            </a:r>
-            <a:endParaRPr lang="en-US" sz="1600" b="1" dirty="0"/>
-          </a:p>
-          <a:p>
-            <a:pPr marL="285750" indent="-285750">
-              <a:spcBef>
-                <a:spcPts val="200"/>
-              </a:spcBef>
-              <a:spcAft>
-                <a:spcPts val="200"/>
-              </a:spcAft>
-              <a:buFontTx/>
-              <a:buChar char="-"/>
-            </a:pPr>
-            <a:r>
-              <a:rPr lang="en-US" sz="1600" b="1" dirty="0" err="1"/>
-              <a:t>AddArea</a:t>
-            </a:r>
-            <a:r>
-              <a:rPr lang="en-US" sz="1600" b="1" dirty="0" smtClean="0"/>
-              <a:t>() </a:t>
-            </a:r>
-          </a:p>
-          <a:p>
-            <a:pPr marL="285750" indent="-285750">
-              <a:spcBef>
-                <a:spcPts val="200"/>
-              </a:spcBef>
-              <a:spcAft>
-                <a:spcPts val="200"/>
-              </a:spcAft>
-              <a:buFontTx/>
-              <a:buChar char="-"/>
-            </a:pPr>
-            <a:r>
-              <a:rPr lang="en-US" sz="1600" b="1" dirty="0" err="1" smtClean="0"/>
-              <a:t>UpdateArea</a:t>
-            </a:r>
-            <a:r>
-              <a:rPr lang="en-US" sz="1600" b="1" dirty="0" smtClean="0"/>
-              <a:t>()</a:t>
-            </a:r>
-            <a:endParaRPr lang="en-US" sz="1600" b="1" dirty="0"/>
-          </a:p>
-        </p:txBody>
-      </p:sp>
-      <p:sp>
-        <p:nvSpPr>
-          <p:cNvPr id="17" name="TextBox 16"/>
+            <a:r>
+              <a:rPr lang="en-US" b="1" noProof="1" smtClean="0"/>
+              <a:t>Pondere</a:t>
+            </a:r>
+          </a:p>
+          <a:p>
+            <a:r>
+              <a:rPr lang="en-US" b="1" noProof="1" smtClean="0"/>
+              <a:t>umiditate</a:t>
+            </a:r>
+            <a:endParaRPr lang="en-US" b="1" noProof="1"/>
+          </a:p>
+        </p:txBody>
+      </p:sp>
+      <p:sp>
+        <p:nvSpPr>
+          <p:cNvPr id="9" name="TextBox 8"/>
           <p:cNvSpPr txBox="1"/>
           <p:nvPr/>
         </p:nvSpPr>
         <p:spPr>
           <a:xfrm>
-            <a:off x="388702" y="3123421"/>
-            <a:ext cx="2819401" cy="2749471"/>
+            <a:off x="1779896" y="3276600"/>
+            <a:ext cx="1828800" cy="400110"/>
           </a:xfrm>
           <a:prstGeom prst="rect">
             <a:avLst/>
@@ -4917,202 +4917,52 @@
           </a:bodyPr>
           <a:lstStyle/>
           <a:p>
-            <a:pPr>
-              <a:spcBef>
-                <a:spcPts val="200"/>
-              </a:spcBef>
-              <a:spcAft>
-                <a:spcPts val="200"/>
-              </a:spcAft>
-            </a:pPr>
-            <a:r>
-              <a:rPr lang="en-US" b="1" dirty="0" err="1" smtClean="0"/>
-              <a:t>Lista</a:t>
-            </a:r>
-            <a:r>
-              <a:rPr lang="en-US" b="1" dirty="0" smtClean="0"/>
-              <a:t> Task - </a:t>
-            </a:r>
-            <a:r>
-              <a:rPr lang="en-US" b="1" dirty="0" err="1" smtClean="0"/>
-              <a:t>uri</a:t>
-            </a:r>
-            <a:r>
-              <a:rPr lang="en-US" b="1" dirty="0" smtClean="0"/>
+            <a:r>
+              <a:rPr lang="en-US" sz="2000" b="1" noProof="1" smtClean="0"/>
+              <a:t>Exemplu</a:t>
+            </a:r>
+            <a:r>
+              <a:rPr lang="en-US" sz="2000" b="1" dirty="0" smtClean="0"/>
               <a:t>:</a:t>
             </a:r>
-          </a:p>
-          <a:p>
-            <a:pPr>
-              <a:spcBef>
-                <a:spcPts val="200"/>
-              </a:spcBef>
-              <a:spcAft>
-                <a:spcPts val="200"/>
-              </a:spcAft>
-            </a:pPr>
-            <a:endParaRPr lang="en-US" sz="1600" b="1" dirty="0" smtClean="0"/>
-          </a:p>
-          <a:p>
-            <a:pPr marL="285750" indent="-285750">
-              <a:spcBef>
-                <a:spcPts val="300"/>
-              </a:spcBef>
-              <a:spcAft>
-                <a:spcPts val="300"/>
-              </a:spcAft>
-              <a:buFont typeface="Calibri" panose="020F0502020204030204" pitchFamily="34" charset="0"/>
-              <a:buChar char="⁻"/>
-            </a:pPr>
-            <a:r>
-              <a:rPr lang="en-US" sz="1600" b="1" dirty="0" err="1" smtClean="0"/>
-              <a:t>FetchRandomValues</a:t>
-            </a:r>
-            <a:r>
-              <a:rPr lang="en-US" sz="1600" b="1" dirty="0" smtClean="0"/>
-              <a:t>()</a:t>
-            </a:r>
-          </a:p>
-          <a:p>
-            <a:pPr marL="285750" indent="-285750">
-              <a:spcBef>
-                <a:spcPts val="300"/>
-              </a:spcBef>
-              <a:spcAft>
-                <a:spcPts val="300"/>
-              </a:spcAft>
-              <a:buFont typeface="Calibri" panose="020F0502020204030204" pitchFamily="34" charset="0"/>
-              <a:buChar char="⁻"/>
-            </a:pPr>
-            <a:r>
-              <a:rPr lang="en-US" sz="1600" b="1" dirty="0" err="1" smtClean="0"/>
-              <a:t>CheckHumidityTresholds</a:t>
-            </a:r>
-            <a:r>
-              <a:rPr lang="en-US" sz="1600" b="1" dirty="0" smtClean="0"/>
-              <a:t>() – </a:t>
-            </a:r>
-            <a:r>
-              <a:rPr lang="en-US" sz="1400" b="1" dirty="0" smtClean="0"/>
-              <a:t>(=&gt;</a:t>
-            </a:r>
-            <a:r>
-              <a:rPr lang="en-US" sz="1400" b="1" dirty="0" err="1" smtClean="0"/>
-              <a:t>opresteApa</a:t>
-            </a:r>
-            <a:r>
-              <a:rPr lang="en-US" sz="1400" b="1" dirty="0" smtClean="0"/>
-              <a:t>, </a:t>
-            </a:r>
-            <a:r>
-              <a:rPr lang="en-US" sz="1400" b="1" dirty="0" err="1" smtClean="0"/>
-              <a:t>PornesteApa</a:t>
-            </a:r>
-            <a:r>
-              <a:rPr lang="en-US" sz="1400" b="1" dirty="0" smtClean="0"/>
-              <a:t>)</a:t>
-            </a:r>
-          </a:p>
-          <a:p>
-            <a:pPr>
-              <a:spcBef>
-                <a:spcPts val="300"/>
-              </a:spcBef>
-              <a:spcAft>
-                <a:spcPts val="300"/>
-              </a:spcAft>
-            </a:pPr>
-            <a:r>
-              <a:rPr lang="en-US" sz="1600" b="1" dirty="0" smtClean="0"/>
-              <a:t>-    </a:t>
-            </a:r>
-            <a:r>
-              <a:rPr lang="en-US" sz="1600" b="1" dirty="0" err="1" smtClean="0"/>
-              <a:t>ManageIrrigationPumps</a:t>
-            </a:r>
-            <a:r>
-              <a:rPr lang="en-US" sz="1600" b="1" dirty="0" smtClean="0"/>
-              <a:t>()</a:t>
-            </a:r>
-            <a:endParaRPr lang="en-US" sz="1600" b="1" dirty="0"/>
-          </a:p>
-          <a:p>
-            <a:pPr marL="285750" indent="-285750">
-              <a:spcBef>
-                <a:spcPts val="300"/>
-              </a:spcBef>
-              <a:spcAft>
-                <a:spcPts val="300"/>
-              </a:spcAft>
-              <a:buFontTx/>
-              <a:buChar char="-"/>
-            </a:pPr>
-            <a:r>
-              <a:rPr lang="en-US" sz="1600" b="1" dirty="0" err="1"/>
-              <a:t>RefreshHeatMap</a:t>
-            </a:r>
-            <a:r>
-              <a:rPr lang="en-US" sz="1600" b="1" dirty="0"/>
-              <a:t>(</a:t>
-            </a:r>
-            <a:r>
-              <a:rPr lang="en-US" sz="1600" b="1" dirty="0" err="1"/>
-              <a:t>getCurrentValues</a:t>
-            </a:r>
-            <a:r>
-              <a:rPr lang="en-US" sz="1600" b="1" dirty="0" smtClean="0"/>
-              <a:t>)</a:t>
-            </a:r>
-          </a:p>
-          <a:p>
-            <a:pPr marL="285750" indent="-285750">
-              <a:spcBef>
-                <a:spcPts val="200"/>
-              </a:spcBef>
-              <a:spcAft>
-                <a:spcPts val="200"/>
-              </a:spcAft>
-              <a:buFontTx/>
-              <a:buChar char="-"/>
-            </a:pPr>
-            <a:endParaRPr lang="en-US" sz="1600" b="1" dirty="0" smtClean="0"/>
-          </a:p>
-        </p:txBody>
-      </p:sp>
-      <p:sp>
-        <p:nvSpPr>
-          <p:cNvPr id="2" name="Title 1"/>
-          <p:cNvSpPr>
-            <a:spLocks noGrp="1"/>
-          </p:cNvSpPr>
-          <p:nvPr>
-            <p:ph type="title"/>
-          </p:nvPr>
+            <a:endParaRPr lang="en-US" sz="2000" b="1" dirty="0"/>
+          </a:p>
+        </p:txBody>
+      </p:sp>
+      <p:sp>
+        <p:nvSpPr>
+          <p:cNvPr id="10" name="TextBox 9"/>
+          <p:cNvSpPr txBox="1"/>
+          <p:nvPr/>
         </p:nvSpPr>
         <p:spPr>
           <a:xfrm>
-            <a:off x="2209800" y="274638"/>
-            <a:ext cx="3602182" cy="639762"/>
-          </a:xfrm>
-        </p:spPr>
-        <p:txBody>
-          <a:bodyPr>
-            <a:noAutofit/>
+            <a:off x="914400" y="1295400"/>
+            <a:ext cx="4474192" cy="415498"/>
+          </a:xfrm>
+          <a:prstGeom prst="rect">
+            <a:avLst/>
+          </a:prstGeom>
+          <a:noFill/>
+        </p:spPr>
+        <p:txBody>
+          <a:bodyPr wrap="square" rtlCol="0">
+            <a:spAutoFit/>
           </a:bodyPr>
           <a:lstStyle/>
           <a:p>
             <a:r>
-              <a:rPr lang="en-US" sz="4400" b="1" dirty="0" err="1" smtClean="0"/>
-              <a:t>Detalii</a:t>
-            </a:r>
-            <a:endParaRPr lang="en-US" sz="4400" b="1" dirty="0"/>
+              <a:rPr lang="en-US" sz="2100" b="1" noProof="1" smtClean="0"/>
+              <a:t>1. Tabel: “HumidityTresholds”</a:t>
+            </a:r>
+            <a:endParaRPr lang="en-US" sz="2100" b="1" noProof="1"/>
           </a:p>
         </p:txBody>
       </p:sp>
     </p:spTree>
     <p:extLst>
       <p:ext uri="{BB962C8B-B14F-4D97-AF65-F5344CB8AC3E}">
-        <p14:creationId xmlns:p14="http://schemas.microsoft.com/office/powerpoint/2010/main" val="3683697301"/>
+        <p14:creationId xmlns:p14="http://schemas.microsoft.com/office/powerpoint/2010/main" val="3842940443"/>
       </p:ext>
     </p:extLst>
   </p:cSld>
@@ -5154,8 +5004,1103 @@
         </p:nvSpPr>
         <p:spPr>
           <a:xfrm>
-            <a:off x="304800" y="271105"/>
-            <a:ext cx="7848600" cy="2185214"/>
+            <a:off x="1066800" y="304800"/>
+            <a:ext cx="3200400" cy="584775"/>
+          </a:xfrm>
+          <a:prstGeom prst="rect">
+            <a:avLst/>
+          </a:prstGeom>
+          <a:noFill/>
+        </p:spPr>
+        <p:txBody>
+          <a:bodyPr wrap="square" rtlCol="0">
+            <a:spAutoFit/>
+          </a:bodyPr>
+          <a:lstStyle/>
+          <a:p>
+            <a:r>
+              <a:rPr lang="en-US" sz="3200" b="1" noProof="1" smtClean="0"/>
+              <a:t>Baza de Date</a:t>
+            </a:r>
+            <a:endParaRPr lang="en-US" sz="3200" b="1" noProof="1"/>
+          </a:p>
+        </p:txBody>
+      </p:sp>
+      <p:graphicFrame>
+        <p:nvGraphicFramePr>
+          <p:cNvPr id="5" name="Table 4"/>
+          <p:cNvGraphicFramePr>
+            <a:graphicFrameLocks noGrp="1"/>
+          </p:cNvGraphicFramePr>
+          <p:nvPr>
+            <p:extLst>
+              <p:ext uri="{D42A27DB-BD31-4B8C-83A1-F6EECF244321}">
+                <p14:modId xmlns:p14="http://schemas.microsoft.com/office/powerpoint/2010/main" val="2884715663"/>
+              </p:ext>
+            </p:extLst>
+          </p:nvPr>
+        </p:nvGraphicFramePr>
+        <p:xfrm>
+          <a:off x="892792" y="1981200"/>
+          <a:ext cx="4038600" cy="767080"/>
+        </p:xfrm>
+        <a:graphic>
+          <a:graphicData uri="http://schemas.openxmlformats.org/drawingml/2006/table">
+            <a:tbl>
+              <a:tblPr firstRow="1" bandRow="1">
+                <a:tableStyleId>{5C22544A-7EE6-4342-B048-85BDC9FD1C3A}</a:tableStyleId>
+              </a:tblPr>
+              <a:tblGrid>
+                <a:gridCol w="2019300"/>
+                <a:gridCol w="2019300"/>
+              </a:tblGrid>
+              <a:tr h="396240">
+                <a:tc>
+                  <a:txBody>
+                    <a:bodyPr/>
+                    <a:lstStyle/>
+                    <a:p>
+                      <a:r>
+                        <a:rPr lang="en-US" noProof="1" smtClean="0"/>
+                        <a:t>NumeParcela</a:t>
+                      </a:r>
+                      <a:endParaRPr lang="en-US" noProof="1"/>
+                    </a:p>
+                  </a:txBody>
+                  <a:tcPr/>
+                </a:tc>
+                <a:tc>
+                  <a:txBody>
+                    <a:bodyPr/>
+                    <a:lstStyle/>
+                    <a:p>
+                      <a:r>
+                        <a:rPr lang="en-US" dirty="0" smtClean="0"/>
+                        <a:t>Grad</a:t>
+                      </a:r>
+                      <a:endParaRPr lang="en-US" dirty="0"/>
+                    </a:p>
+                  </a:txBody>
+                  <a:tcPr/>
+                </a:tc>
+              </a:tr>
+              <a:tr h="370840">
+                <a:tc>
+                  <a:txBody>
+                    <a:bodyPr/>
+                    <a:lstStyle/>
+                    <a:p>
+                      <a:r>
+                        <a:rPr lang="en-US" noProof="1" smtClean="0"/>
+                        <a:t>Primary key</a:t>
+                      </a:r>
+                      <a:endParaRPr lang="en-US" noProof="1"/>
+                    </a:p>
+                  </a:txBody>
+                  <a:tcPr/>
+                </a:tc>
+                <a:tc>
+                  <a:txBody>
+                    <a:bodyPr/>
+                    <a:lstStyle/>
+                    <a:p>
+                      <a:r>
+                        <a:rPr lang="en-US" noProof="1" smtClean="0"/>
+                        <a:t>Foreign Key</a:t>
+                      </a:r>
+                      <a:endParaRPr lang="en-US" noProof="1"/>
+                    </a:p>
+                  </a:txBody>
+                  <a:tcPr/>
+                </a:tc>
+              </a:tr>
+            </a:tbl>
+          </a:graphicData>
+        </a:graphic>
+      </p:graphicFrame>
+      <p:graphicFrame>
+        <p:nvGraphicFramePr>
+          <p:cNvPr id="6" name="Table 5"/>
+          <p:cNvGraphicFramePr>
+            <a:graphicFrameLocks noGrp="1"/>
+          </p:cNvGraphicFramePr>
+          <p:nvPr>
+            <p:extLst>
+              <p:ext uri="{D42A27DB-BD31-4B8C-83A1-F6EECF244321}">
+                <p14:modId xmlns:p14="http://schemas.microsoft.com/office/powerpoint/2010/main" val="2311165823"/>
+              </p:ext>
+            </p:extLst>
+          </p:nvPr>
+        </p:nvGraphicFramePr>
+        <p:xfrm>
+          <a:off x="865496" y="3733800"/>
+          <a:ext cx="4038600" cy="2595880"/>
+        </p:xfrm>
+        <a:graphic>
+          <a:graphicData uri="http://schemas.openxmlformats.org/drawingml/2006/table">
+            <a:tbl>
+              <a:tblPr firstRow="1" bandRow="1">
+                <a:tableStyleId>{5C22544A-7EE6-4342-B048-85BDC9FD1C3A}</a:tableStyleId>
+              </a:tblPr>
+              <a:tblGrid>
+                <a:gridCol w="2019300"/>
+                <a:gridCol w="2019300"/>
+              </a:tblGrid>
+              <a:tr h="370840">
+                <a:tc>
+                  <a:txBody>
+                    <a:bodyPr/>
+                    <a:lstStyle/>
+                    <a:p>
+                      <a:r>
+                        <a:rPr lang="en-US" noProof="1" smtClean="0"/>
+                        <a:t>NumeParcela</a:t>
+                      </a:r>
+                      <a:endParaRPr lang="en-US" noProof="1"/>
+                    </a:p>
+                  </a:txBody>
+                  <a:tcPr/>
+                </a:tc>
+                <a:tc>
+                  <a:txBody>
+                    <a:bodyPr/>
+                    <a:lstStyle/>
+                    <a:p>
+                      <a:r>
+                        <a:rPr lang="en-US" dirty="0" smtClean="0"/>
+                        <a:t>Grad</a:t>
+                      </a:r>
+                      <a:endParaRPr lang="en-US" dirty="0"/>
+                    </a:p>
+                  </a:txBody>
+                  <a:tcPr/>
+                </a:tc>
+              </a:tr>
+              <a:tr h="370840">
+                <a:tc>
+                  <a:txBody>
+                    <a:bodyPr/>
+                    <a:lstStyle/>
+                    <a:p>
+                      <a:r>
+                        <a:rPr lang="en-US" noProof="1" smtClean="0"/>
+                        <a:t>Primary key</a:t>
+                      </a:r>
+                      <a:endParaRPr lang="en-US" noProof="1"/>
+                    </a:p>
+                  </a:txBody>
+                  <a:tcPr/>
+                </a:tc>
+                <a:tc>
+                  <a:txBody>
+                    <a:bodyPr/>
+                    <a:lstStyle/>
+                    <a:p>
+                      <a:r>
+                        <a:rPr lang="en-US" noProof="1" smtClean="0"/>
+                        <a:t>Foreign Key</a:t>
+                      </a:r>
+                      <a:endParaRPr lang="en-US" noProof="1"/>
+                    </a:p>
+                  </a:txBody>
+                  <a:tcPr/>
+                </a:tc>
+              </a:tr>
+              <a:tr h="370840">
+                <a:tc>
+                  <a:txBody>
+                    <a:bodyPr/>
+                    <a:lstStyle/>
+                    <a:p>
+                      <a:r>
+                        <a:rPr lang="en-US" dirty="0" smtClean="0"/>
+                        <a:t>A</a:t>
+                      </a:r>
+                      <a:endParaRPr lang="en-US" dirty="0"/>
+                    </a:p>
+                  </a:txBody>
+                  <a:tcPr/>
+                </a:tc>
+                <a:tc>
+                  <a:txBody>
+                    <a:bodyPr/>
+                    <a:lstStyle/>
+                    <a:p>
+                      <a:r>
+                        <a:rPr lang="en-US" dirty="0" smtClean="0"/>
+                        <a:t>1</a:t>
+                      </a:r>
+                      <a:endParaRPr lang="en-US" dirty="0"/>
+                    </a:p>
+                  </a:txBody>
+                  <a:tcPr/>
+                </a:tc>
+              </a:tr>
+              <a:tr h="370840">
+                <a:tc>
+                  <a:txBody>
+                    <a:bodyPr/>
+                    <a:lstStyle/>
+                    <a:p>
+                      <a:r>
+                        <a:rPr lang="en-US" dirty="0" smtClean="0"/>
+                        <a:t>B</a:t>
+                      </a:r>
+                      <a:endParaRPr lang="en-US" dirty="0"/>
+                    </a:p>
+                  </a:txBody>
+                  <a:tcPr/>
+                </a:tc>
+                <a:tc>
+                  <a:txBody>
+                    <a:bodyPr/>
+                    <a:lstStyle/>
+                    <a:p>
+                      <a:r>
+                        <a:rPr lang="en-US" dirty="0" smtClean="0"/>
+                        <a:t>1</a:t>
+                      </a:r>
+                      <a:endParaRPr lang="en-US" dirty="0"/>
+                    </a:p>
+                  </a:txBody>
+                  <a:tcPr/>
+                </a:tc>
+              </a:tr>
+              <a:tr h="370840">
+                <a:tc>
+                  <a:txBody>
+                    <a:bodyPr/>
+                    <a:lstStyle/>
+                    <a:p>
+                      <a:r>
+                        <a:rPr lang="en-US" dirty="0" smtClean="0"/>
+                        <a:t>C</a:t>
+                      </a:r>
+                      <a:endParaRPr lang="en-US" dirty="0"/>
+                    </a:p>
+                  </a:txBody>
+                  <a:tcPr/>
+                </a:tc>
+                <a:tc>
+                  <a:txBody>
+                    <a:bodyPr/>
+                    <a:lstStyle/>
+                    <a:p>
+                      <a:r>
+                        <a:rPr lang="en-US" dirty="0" smtClean="0"/>
+                        <a:t>5</a:t>
+                      </a:r>
+                      <a:endParaRPr lang="en-US" dirty="0"/>
+                    </a:p>
+                  </a:txBody>
+                  <a:tcPr/>
+                </a:tc>
+              </a:tr>
+              <a:tr h="370840">
+                <a:tc>
+                  <a:txBody>
+                    <a:bodyPr/>
+                    <a:lstStyle/>
+                    <a:p>
+                      <a:r>
+                        <a:rPr lang="en-US" dirty="0" smtClean="0"/>
+                        <a:t>D</a:t>
+                      </a:r>
+                      <a:endParaRPr lang="en-US" dirty="0"/>
+                    </a:p>
+                  </a:txBody>
+                  <a:tcPr/>
+                </a:tc>
+                <a:tc>
+                  <a:txBody>
+                    <a:bodyPr/>
+                    <a:lstStyle/>
+                    <a:p>
+                      <a:r>
+                        <a:rPr lang="en-US" dirty="0" smtClean="0"/>
+                        <a:t>4</a:t>
+                      </a:r>
+                      <a:endParaRPr lang="en-US" dirty="0"/>
+                    </a:p>
+                  </a:txBody>
+                  <a:tcPr/>
+                </a:tc>
+              </a:tr>
+              <a:tr h="370840">
+                <a:tc>
+                  <a:txBody>
+                    <a:bodyPr/>
+                    <a:lstStyle/>
+                    <a:p>
+                      <a:r>
+                        <a:rPr lang="en-US" dirty="0" smtClean="0"/>
+                        <a:t>E</a:t>
+                      </a:r>
+                      <a:endParaRPr lang="en-US" dirty="0"/>
+                    </a:p>
+                  </a:txBody>
+                  <a:tcPr/>
+                </a:tc>
+                <a:tc>
+                  <a:txBody>
+                    <a:bodyPr/>
+                    <a:lstStyle/>
+                    <a:p>
+                      <a:r>
+                        <a:rPr lang="en-US" dirty="0" smtClean="0"/>
+                        <a:t>3</a:t>
+                      </a:r>
+                      <a:endParaRPr lang="en-US" dirty="0"/>
+                    </a:p>
+                  </a:txBody>
+                  <a:tcPr/>
+                </a:tc>
+              </a:tr>
+            </a:tbl>
+          </a:graphicData>
+        </a:graphic>
+      </p:graphicFrame>
+      <p:sp>
+        <p:nvSpPr>
+          <p:cNvPr id="9" name="TextBox 8"/>
+          <p:cNvSpPr txBox="1"/>
+          <p:nvPr/>
+        </p:nvSpPr>
+        <p:spPr>
+          <a:xfrm>
+            <a:off x="1779896" y="3276600"/>
+            <a:ext cx="1828800" cy="400110"/>
+          </a:xfrm>
+          <a:prstGeom prst="rect">
+            <a:avLst/>
+          </a:prstGeom>
+          <a:noFill/>
+        </p:spPr>
+        <p:txBody>
+          <a:bodyPr wrap="square" rtlCol="0">
+            <a:spAutoFit/>
+          </a:bodyPr>
+          <a:lstStyle/>
+          <a:p>
+            <a:r>
+              <a:rPr lang="en-US" sz="2000" b="1" noProof="1" smtClean="0"/>
+              <a:t>Exemplu</a:t>
+            </a:r>
+            <a:r>
+              <a:rPr lang="en-US" sz="2000" b="1" dirty="0" smtClean="0"/>
+              <a:t>:</a:t>
+            </a:r>
+            <a:endParaRPr lang="en-US" sz="2000" b="1" dirty="0"/>
+          </a:p>
+        </p:txBody>
+      </p:sp>
+      <p:sp>
+        <p:nvSpPr>
+          <p:cNvPr id="10" name="TextBox 9"/>
+          <p:cNvSpPr txBox="1"/>
+          <p:nvPr/>
+        </p:nvSpPr>
+        <p:spPr>
+          <a:xfrm>
+            <a:off x="914400" y="1295400"/>
+            <a:ext cx="4474192" cy="415498"/>
+          </a:xfrm>
+          <a:prstGeom prst="rect">
+            <a:avLst/>
+          </a:prstGeom>
+          <a:noFill/>
+        </p:spPr>
+        <p:txBody>
+          <a:bodyPr wrap="square" rtlCol="0">
+            <a:spAutoFit/>
+          </a:bodyPr>
+          <a:lstStyle/>
+          <a:p>
+            <a:r>
+              <a:rPr lang="en-US" sz="2100" b="1" noProof="1"/>
+              <a:t>2</a:t>
+            </a:r>
+            <a:r>
+              <a:rPr lang="en-US" sz="2100" b="1" noProof="1" smtClean="0"/>
+              <a:t>. </a:t>
+            </a:r>
+            <a:r>
+              <a:rPr lang="en-US" sz="2100" b="1" noProof="1" smtClean="0"/>
+              <a:t>Tabel</a:t>
+            </a:r>
+            <a:r>
+              <a:rPr lang="en-US" sz="2100" b="1" noProof="1" smtClean="0"/>
+              <a:t>: </a:t>
+            </a:r>
+            <a:r>
+              <a:rPr lang="en-US" sz="2100" b="1" noProof="1" smtClean="0"/>
+              <a:t>“Parcels”</a:t>
+            </a:r>
+            <a:endParaRPr lang="en-US" sz="2100" b="1" noProof="1"/>
+          </a:p>
+        </p:txBody>
+      </p:sp>
+    </p:spTree>
+    <p:extLst>
+      <p:ext uri="{BB962C8B-B14F-4D97-AF65-F5344CB8AC3E}">
+        <p14:creationId xmlns:p14="http://schemas.microsoft.com/office/powerpoint/2010/main" val="136789522"/>
+      </p:ext>
+    </p:extLst>
+  </p:cSld>
+  <p:clrMapOvr>
+    <a:masterClrMapping/>
+  </p:clrMapOvr>
+  <p:timing>
+    <p:tnLst>
+      <p:par>
+        <p:cTn id="1" dur="indefinite" restart="never" nodeType="tmRoot"/>
+      </p:par>
+    </p:tnLst>
+  </p:timing>
+</p:sld>
+</file>
+
+<file path=ppt/slides/slide5.xml><?xml version="1.0" encoding="utf-8"?>
+<p:sld xmlns:a="http://schemas.openxmlformats.org/drawingml/2006/main" xmlns:r="http://schemas.openxmlformats.org/officeDocument/2006/relationships" xmlns:p="http://schemas.openxmlformats.org/presentationml/2006/main">
+  <p:cSld>
+    <p:spTree>
+      <p:nvGrpSpPr>
+        <p:cNvPr id="1" name=""/>
+        <p:cNvGrpSpPr/>
+        <p:nvPr/>
+      </p:nvGrpSpPr>
+      <p:grpSpPr>
+        <a:xfrm>
+          <a:off x="0" y="0"/>
+          <a:ext cx="0" cy="0"/>
+          <a:chOff x="0" y="0"/>
+          <a:chExt cx="0" cy="0"/>
+        </a:xfrm>
+      </p:grpSpPr>
+      <p:sp>
+        <p:nvSpPr>
+          <p:cNvPr id="4" name="TextBox 3"/>
+          <p:cNvSpPr txBox="1"/>
+          <p:nvPr/>
+        </p:nvSpPr>
+        <p:spPr>
+          <a:xfrm>
+            <a:off x="1066800" y="304800"/>
+            <a:ext cx="3200400" cy="584775"/>
+          </a:xfrm>
+          <a:prstGeom prst="rect">
+            <a:avLst/>
+          </a:prstGeom>
+          <a:noFill/>
+        </p:spPr>
+        <p:txBody>
+          <a:bodyPr wrap="square" rtlCol="0">
+            <a:spAutoFit/>
+          </a:bodyPr>
+          <a:lstStyle/>
+          <a:p>
+            <a:r>
+              <a:rPr lang="en-US" sz="3200" b="1" noProof="1" smtClean="0"/>
+              <a:t>Baza de Date</a:t>
+            </a:r>
+            <a:endParaRPr lang="en-US" sz="3200" b="1" noProof="1"/>
+          </a:p>
+        </p:txBody>
+      </p:sp>
+      <p:graphicFrame>
+        <p:nvGraphicFramePr>
+          <p:cNvPr id="5" name="Table 4"/>
+          <p:cNvGraphicFramePr>
+            <a:graphicFrameLocks noGrp="1"/>
+          </p:cNvGraphicFramePr>
+          <p:nvPr>
+            <p:extLst>
+              <p:ext uri="{D42A27DB-BD31-4B8C-83A1-F6EECF244321}">
+                <p14:modId xmlns:p14="http://schemas.microsoft.com/office/powerpoint/2010/main" val="1233183662"/>
+              </p:ext>
+            </p:extLst>
+          </p:nvPr>
+        </p:nvGraphicFramePr>
+        <p:xfrm>
+          <a:off x="892792" y="1981200"/>
+          <a:ext cx="4038600" cy="767080"/>
+        </p:xfrm>
+        <a:graphic>
+          <a:graphicData uri="http://schemas.openxmlformats.org/drawingml/2006/table">
+            <a:tbl>
+              <a:tblPr firstRow="1" bandRow="1">
+                <a:tableStyleId>{5C22544A-7EE6-4342-B048-85BDC9FD1C3A}</a:tableStyleId>
+              </a:tblPr>
+              <a:tblGrid>
+                <a:gridCol w="2019300"/>
+                <a:gridCol w="2019300"/>
+              </a:tblGrid>
+              <a:tr h="396240">
+                <a:tc>
+                  <a:txBody>
+                    <a:bodyPr/>
+                    <a:lstStyle/>
+                    <a:p>
+                      <a:r>
+                        <a:rPr lang="en-US" noProof="1" smtClean="0"/>
+                        <a:t>NumeParcela</a:t>
+                      </a:r>
+                      <a:endParaRPr lang="en-US" noProof="1"/>
+                    </a:p>
+                  </a:txBody>
+                  <a:tcPr/>
+                </a:tc>
+                <a:tc>
+                  <a:txBody>
+                    <a:bodyPr/>
+                    <a:lstStyle/>
+                    <a:p>
+                      <a:r>
+                        <a:rPr lang="en-US" dirty="0" smtClean="0"/>
+                        <a:t>Grad</a:t>
+                      </a:r>
+                      <a:endParaRPr lang="en-US" dirty="0"/>
+                    </a:p>
+                  </a:txBody>
+                  <a:tcPr/>
+                </a:tc>
+              </a:tr>
+              <a:tr h="370840">
+                <a:tc>
+                  <a:txBody>
+                    <a:bodyPr/>
+                    <a:lstStyle/>
+                    <a:p>
+                      <a:r>
+                        <a:rPr lang="en-US" noProof="1" smtClean="0"/>
+                        <a:t>Primary key</a:t>
+                      </a:r>
+                      <a:endParaRPr lang="en-US" noProof="1"/>
+                    </a:p>
+                  </a:txBody>
+                  <a:tcPr/>
+                </a:tc>
+                <a:tc>
+                  <a:txBody>
+                    <a:bodyPr/>
+                    <a:lstStyle/>
+                    <a:p>
+                      <a:r>
+                        <a:rPr lang="en-US" noProof="1" smtClean="0"/>
+                        <a:t>Foreign Key</a:t>
+                      </a:r>
+                      <a:endParaRPr lang="en-US" noProof="1"/>
+                    </a:p>
+                  </a:txBody>
+                  <a:tcPr/>
+                </a:tc>
+              </a:tr>
+            </a:tbl>
+          </a:graphicData>
+        </a:graphic>
+      </p:graphicFrame>
+      <p:graphicFrame>
+        <p:nvGraphicFramePr>
+          <p:cNvPr id="6" name="Table 5"/>
+          <p:cNvGraphicFramePr>
+            <a:graphicFrameLocks noGrp="1"/>
+          </p:cNvGraphicFramePr>
+          <p:nvPr>
+            <p:extLst>
+              <p:ext uri="{D42A27DB-BD31-4B8C-83A1-F6EECF244321}">
+                <p14:modId xmlns:p14="http://schemas.microsoft.com/office/powerpoint/2010/main" val="2104251031"/>
+              </p:ext>
+            </p:extLst>
+          </p:nvPr>
+        </p:nvGraphicFramePr>
+        <p:xfrm>
+          <a:off x="865496" y="3733800"/>
+          <a:ext cx="4316104" cy="2606040"/>
+        </p:xfrm>
+        <a:graphic>
+          <a:graphicData uri="http://schemas.openxmlformats.org/drawingml/2006/table">
+            <a:tbl>
+              <a:tblPr firstRow="1" bandRow="1">
+                <a:tableStyleId>{5C22544A-7EE6-4342-B048-85BDC9FD1C3A}</a:tableStyleId>
+              </a:tblPr>
+              <a:tblGrid>
+                <a:gridCol w="2158052"/>
+                <a:gridCol w="2158052"/>
+              </a:tblGrid>
+              <a:tr h="381000">
+                <a:tc>
+                  <a:txBody>
+                    <a:bodyPr/>
+                    <a:lstStyle/>
+                    <a:p>
+                      <a:r>
+                        <a:rPr lang="en-US" noProof="1" smtClean="0"/>
+                        <a:t>NumeParcela</a:t>
+                      </a:r>
+                      <a:endParaRPr lang="en-US" noProof="1"/>
+                    </a:p>
+                  </a:txBody>
+                  <a:tcPr/>
+                </a:tc>
+                <a:tc>
+                  <a:txBody>
+                    <a:bodyPr/>
+                    <a:lstStyle/>
+                    <a:p>
+                      <a:r>
+                        <a:rPr lang="en-US" dirty="0" err="1" smtClean="0"/>
+                        <a:t>ValoareUmiditate</a:t>
+                      </a:r>
+                      <a:endParaRPr lang="en-US" dirty="0"/>
+                    </a:p>
+                  </a:txBody>
+                  <a:tcPr/>
+                </a:tc>
+              </a:tr>
+              <a:tr h="370840">
+                <a:tc>
+                  <a:txBody>
+                    <a:bodyPr/>
+                    <a:lstStyle/>
+                    <a:p>
+                      <a:r>
+                        <a:rPr lang="en-US" noProof="1" smtClean="0"/>
+                        <a:t>Primary key</a:t>
+                      </a:r>
+                      <a:endParaRPr lang="en-US" noProof="1"/>
+                    </a:p>
+                  </a:txBody>
+                  <a:tcPr/>
+                </a:tc>
+                <a:tc>
+                  <a:txBody>
+                    <a:bodyPr/>
+                    <a:lstStyle/>
+                    <a:p>
+                      <a:r>
+                        <a:rPr lang="en-US" noProof="1" smtClean="0"/>
+                        <a:t>Foreign Key</a:t>
+                      </a:r>
+                      <a:endParaRPr lang="en-US" noProof="1"/>
+                    </a:p>
+                  </a:txBody>
+                  <a:tcPr/>
+                </a:tc>
+              </a:tr>
+              <a:tr h="370840">
+                <a:tc>
+                  <a:txBody>
+                    <a:bodyPr/>
+                    <a:lstStyle/>
+                    <a:p>
+                      <a:r>
+                        <a:rPr lang="en-US" dirty="0" smtClean="0"/>
+                        <a:t>A</a:t>
+                      </a:r>
+                      <a:endParaRPr lang="en-US" dirty="0"/>
+                    </a:p>
+                  </a:txBody>
+                  <a:tcPr/>
+                </a:tc>
+                <a:tc>
+                  <a:txBody>
+                    <a:bodyPr/>
+                    <a:lstStyle/>
+                    <a:p>
+                      <a:r>
+                        <a:rPr lang="en-US" dirty="0" smtClean="0"/>
+                        <a:t>5</a:t>
+                      </a:r>
+                      <a:endParaRPr lang="en-US" dirty="0"/>
+                    </a:p>
+                  </a:txBody>
+                  <a:tcPr/>
+                </a:tc>
+              </a:tr>
+              <a:tr h="370840">
+                <a:tc>
+                  <a:txBody>
+                    <a:bodyPr/>
+                    <a:lstStyle/>
+                    <a:p>
+                      <a:r>
+                        <a:rPr lang="en-US" dirty="0" smtClean="0"/>
+                        <a:t>B</a:t>
+                      </a:r>
+                      <a:endParaRPr lang="en-US" dirty="0"/>
+                    </a:p>
+                  </a:txBody>
+                  <a:tcPr/>
+                </a:tc>
+                <a:tc>
+                  <a:txBody>
+                    <a:bodyPr/>
+                    <a:lstStyle/>
+                    <a:p>
+                      <a:r>
+                        <a:rPr lang="en-US" dirty="0" smtClean="0"/>
+                        <a:t>80</a:t>
+                      </a:r>
+                      <a:endParaRPr lang="en-US" dirty="0"/>
+                    </a:p>
+                  </a:txBody>
+                  <a:tcPr/>
+                </a:tc>
+              </a:tr>
+              <a:tr h="370840">
+                <a:tc>
+                  <a:txBody>
+                    <a:bodyPr/>
+                    <a:lstStyle/>
+                    <a:p>
+                      <a:r>
+                        <a:rPr lang="en-US" dirty="0" smtClean="0"/>
+                        <a:t>C</a:t>
+                      </a:r>
+                      <a:endParaRPr lang="en-US" dirty="0"/>
+                    </a:p>
+                  </a:txBody>
+                  <a:tcPr/>
+                </a:tc>
+                <a:tc>
+                  <a:txBody>
+                    <a:bodyPr/>
+                    <a:lstStyle/>
+                    <a:p>
+                      <a:r>
+                        <a:rPr lang="en-US" dirty="0" smtClean="0"/>
+                        <a:t>39</a:t>
+                      </a:r>
+                      <a:endParaRPr lang="en-US" dirty="0"/>
+                    </a:p>
+                  </a:txBody>
+                  <a:tcPr/>
+                </a:tc>
+              </a:tr>
+              <a:tr h="370840">
+                <a:tc>
+                  <a:txBody>
+                    <a:bodyPr/>
+                    <a:lstStyle/>
+                    <a:p>
+                      <a:r>
+                        <a:rPr lang="en-US" dirty="0" smtClean="0"/>
+                        <a:t>D</a:t>
+                      </a:r>
+                      <a:endParaRPr lang="en-US" dirty="0"/>
+                    </a:p>
+                  </a:txBody>
+                  <a:tcPr/>
+                </a:tc>
+                <a:tc>
+                  <a:txBody>
+                    <a:bodyPr/>
+                    <a:lstStyle/>
+                    <a:p>
+                      <a:r>
+                        <a:rPr lang="en-US" dirty="0" smtClean="0"/>
+                        <a:t>41</a:t>
+                      </a:r>
+                      <a:endParaRPr lang="en-US" dirty="0"/>
+                    </a:p>
+                  </a:txBody>
+                  <a:tcPr/>
+                </a:tc>
+              </a:tr>
+              <a:tr h="370840">
+                <a:tc>
+                  <a:txBody>
+                    <a:bodyPr/>
+                    <a:lstStyle/>
+                    <a:p>
+                      <a:r>
+                        <a:rPr lang="en-US" dirty="0" smtClean="0"/>
+                        <a:t>E</a:t>
+                      </a:r>
+                      <a:endParaRPr lang="en-US" dirty="0"/>
+                    </a:p>
+                  </a:txBody>
+                  <a:tcPr/>
+                </a:tc>
+                <a:tc>
+                  <a:txBody>
+                    <a:bodyPr/>
+                    <a:lstStyle/>
+                    <a:p>
+                      <a:r>
+                        <a:rPr lang="en-US" dirty="0" smtClean="0"/>
+                        <a:t>32</a:t>
+                      </a:r>
+                      <a:endParaRPr lang="en-US" dirty="0"/>
+                    </a:p>
+                  </a:txBody>
+                  <a:tcPr/>
+                </a:tc>
+              </a:tr>
+            </a:tbl>
+          </a:graphicData>
+        </a:graphic>
+      </p:graphicFrame>
+      <p:sp>
+        <p:nvSpPr>
+          <p:cNvPr id="9" name="TextBox 8"/>
+          <p:cNvSpPr txBox="1"/>
+          <p:nvPr/>
+        </p:nvSpPr>
+        <p:spPr>
+          <a:xfrm>
+            <a:off x="1779896" y="3276600"/>
+            <a:ext cx="1828800" cy="400110"/>
+          </a:xfrm>
+          <a:prstGeom prst="rect">
+            <a:avLst/>
+          </a:prstGeom>
+          <a:noFill/>
+        </p:spPr>
+        <p:txBody>
+          <a:bodyPr wrap="square" rtlCol="0">
+            <a:spAutoFit/>
+          </a:bodyPr>
+          <a:lstStyle/>
+          <a:p>
+            <a:r>
+              <a:rPr lang="en-US" sz="2000" b="1" noProof="1" smtClean="0"/>
+              <a:t>Exemplu</a:t>
+            </a:r>
+            <a:r>
+              <a:rPr lang="en-US" sz="2000" b="1" dirty="0" smtClean="0"/>
+              <a:t>:</a:t>
+            </a:r>
+            <a:endParaRPr lang="en-US" sz="2000" b="1" dirty="0"/>
+          </a:p>
+        </p:txBody>
+      </p:sp>
+      <p:sp>
+        <p:nvSpPr>
+          <p:cNvPr id="10" name="TextBox 9"/>
+          <p:cNvSpPr txBox="1"/>
+          <p:nvPr/>
+        </p:nvSpPr>
+        <p:spPr>
+          <a:xfrm>
+            <a:off x="914400" y="1295400"/>
+            <a:ext cx="4474192" cy="415498"/>
+          </a:xfrm>
+          <a:prstGeom prst="rect">
+            <a:avLst/>
+          </a:prstGeom>
+          <a:noFill/>
+        </p:spPr>
+        <p:txBody>
+          <a:bodyPr wrap="square" rtlCol="0">
+            <a:spAutoFit/>
+          </a:bodyPr>
+          <a:lstStyle/>
+          <a:p>
+            <a:r>
+              <a:rPr lang="en-US" sz="2100" b="1" noProof="1" smtClean="0"/>
+              <a:t>3</a:t>
+            </a:r>
+            <a:r>
+              <a:rPr lang="en-US" sz="2100" b="1" noProof="1" smtClean="0"/>
+              <a:t>. </a:t>
+            </a:r>
+            <a:r>
+              <a:rPr lang="en-US" sz="2100" b="1" noProof="1" smtClean="0"/>
+              <a:t>Tabel</a:t>
+            </a:r>
+            <a:r>
+              <a:rPr lang="en-US" sz="2100" b="1" noProof="1" smtClean="0"/>
+              <a:t>: </a:t>
+            </a:r>
+            <a:r>
+              <a:rPr lang="en-US" sz="2100" b="1" noProof="1" smtClean="0"/>
+              <a:t>“RealTimeValues”</a:t>
+            </a:r>
+            <a:endParaRPr lang="en-US" sz="2100" b="1" noProof="1"/>
+          </a:p>
+        </p:txBody>
+      </p:sp>
+    </p:spTree>
+    <p:extLst>
+      <p:ext uri="{BB962C8B-B14F-4D97-AF65-F5344CB8AC3E}">
+        <p14:creationId xmlns:p14="http://schemas.microsoft.com/office/powerpoint/2010/main" val="947977313"/>
+      </p:ext>
+    </p:extLst>
+  </p:cSld>
+  <p:clrMapOvr>
+    <a:masterClrMapping/>
+  </p:clrMapOvr>
+  <p:timing>
+    <p:tnLst>
+      <p:par>
+        <p:cTn id="1" dur="indefinite" restart="never" nodeType="tmRoot"/>
+      </p:par>
+    </p:tnLst>
+  </p:timing>
+</p:sld>
+</file>
+
+<file path=ppt/slides/slide6.xml><?xml version="1.0" encoding="utf-8"?>
+<p:sld xmlns:a="http://schemas.openxmlformats.org/drawingml/2006/main" xmlns:r="http://schemas.openxmlformats.org/officeDocument/2006/relationships" xmlns:p="http://schemas.openxmlformats.org/presentationml/2006/main">
+  <p:cSld>
+    <p:spTree>
+      <p:nvGrpSpPr>
+        <p:cNvPr id="1" name=""/>
+        <p:cNvGrpSpPr/>
+        <p:nvPr/>
+      </p:nvGrpSpPr>
+      <p:grpSpPr>
+        <a:xfrm>
+          <a:off x="0" y="0"/>
+          <a:ext cx="0" cy="0"/>
+          <a:chOff x="0" y="0"/>
+          <a:chExt cx="0" cy="0"/>
+        </a:xfrm>
+      </p:grpSpPr>
+      <p:sp>
+        <p:nvSpPr>
+          <p:cNvPr id="6" name="TextBox 5"/>
+          <p:cNvSpPr txBox="1"/>
+          <p:nvPr/>
+        </p:nvSpPr>
+        <p:spPr>
+          <a:xfrm>
+            <a:off x="378311" y="902451"/>
+            <a:ext cx="2451480" cy="861774"/>
+          </a:xfrm>
+          <a:prstGeom prst="rect">
+            <a:avLst/>
+          </a:prstGeom>
+          <a:noFill/>
+          <a:ln w="38100">
+            <a:solidFill>
+              <a:schemeClr val="tx1"/>
+            </a:solidFill>
+          </a:ln>
+        </p:spPr>
+        <p:txBody>
+          <a:bodyPr wrap="square" rtlCol="0">
+            <a:spAutoFit/>
+          </a:bodyPr>
+          <a:lstStyle/>
+          <a:p>
+            <a:r>
+              <a:rPr lang="en-US" sz="1600" i="1" noProof="1" smtClean="0"/>
+              <a:t>In Cloud Azure – web job</a:t>
+            </a:r>
+          </a:p>
+          <a:p>
+            <a:r>
+              <a:rPr lang="en-US" b="1" noProof="1" smtClean="0"/>
+              <a:t>Background Worker</a:t>
+            </a:r>
+          </a:p>
+          <a:p>
+            <a:r>
+              <a:rPr lang="en-US" sz="1600" noProof="1" smtClean="0"/>
+              <a:t>Indreica Claudia</a:t>
+            </a:r>
+            <a:endParaRPr lang="en-US" sz="1600" noProof="1"/>
+          </a:p>
+        </p:txBody>
+      </p:sp>
+      <p:sp>
+        <p:nvSpPr>
+          <p:cNvPr id="7" name="TextBox 6"/>
+          <p:cNvSpPr txBox="1"/>
+          <p:nvPr/>
+        </p:nvSpPr>
+        <p:spPr>
+          <a:xfrm>
+            <a:off x="3494809" y="902451"/>
+            <a:ext cx="2286000" cy="892552"/>
+          </a:xfrm>
+          <a:prstGeom prst="rect">
+            <a:avLst/>
+          </a:prstGeom>
+          <a:noFill/>
+          <a:ln w="38100">
+            <a:solidFill>
+              <a:schemeClr val="tx1"/>
+            </a:solidFill>
+          </a:ln>
+        </p:spPr>
+        <p:txBody>
+          <a:bodyPr wrap="square" rtlCol="0">
+            <a:spAutoFit/>
+          </a:bodyPr>
+          <a:lstStyle/>
+          <a:p>
+            <a:r>
+              <a:rPr lang="en-US" b="1" noProof="1" smtClean="0"/>
+              <a:t>Aplicatie </a:t>
+            </a:r>
+            <a:r>
+              <a:rPr lang="en-US" b="1" noProof="1" smtClean="0"/>
+              <a:t>Web/Mobile</a:t>
+            </a:r>
+          </a:p>
+          <a:p>
+            <a:r>
+              <a:rPr lang="en-US" sz="1600" noProof="1" smtClean="0"/>
+              <a:t>Adrian Ioncsov</a:t>
+            </a:r>
+            <a:endParaRPr lang="en-US" sz="1600" noProof="1"/>
+          </a:p>
+        </p:txBody>
+      </p:sp>
+      <p:sp>
+        <p:nvSpPr>
+          <p:cNvPr id="8" name="TextBox 7"/>
+          <p:cNvSpPr txBox="1"/>
+          <p:nvPr/>
+        </p:nvSpPr>
+        <p:spPr>
+          <a:xfrm>
+            <a:off x="6682853" y="902451"/>
+            <a:ext cx="2026693" cy="615553"/>
+          </a:xfrm>
+          <a:prstGeom prst="rect">
+            <a:avLst/>
+          </a:prstGeom>
+          <a:noFill/>
+          <a:ln w="38100">
+            <a:solidFill>
+              <a:schemeClr val="tx1"/>
+            </a:solidFill>
+          </a:ln>
+        </p:spPr>
+        <p:txBody>
+          <a:bodyPr wrap="square" rtlCol="0">
+            <a:spAutoFit/>
+          </a:bodyPr>
+          <a:lstStyle/>
+          <a:p>
+            <a:r>
+              <a:rPr lang="en-US" b="1" noProof="1" smtClean="0"/>
+              <a:t>Generare Date</a:t>
+            </a:r>
+          </a:p>
+          <a:p>
+            <a:r>
+              <a:rPr lang="en-US" sz="1600" noProof="1" smtClean="0"/>
+              <a:t>Dan Marcel</a:t>
+            </a:r>
+            <a:endParaRPr lang="en-US" sz="1600" noProof="1"/>
+          </a:p>
+        </p:txBody>
+      </p:sp>
+      <p:sp>
+        <p:nvSpPr>
+          <p:cNvPr id="11" name="TextBox 10"/>
+          <p:cNvSpPr txBox="1"/>
+          <p:nvPr/>
+        </p:nvSpPr>
+        <p:spPr>
+          <a:xfrm>
+            <a:off x="6117609" y="2419220"/>
+            <a:ext cx="3200400" cy="2215991"/>
           </a:xfrm>
           <a:prstGeom prst="rect">
             <a:avLst/>
@@ -5177,8 +6122,8 @@
               </a:spcAft>
             </a:pPr>
             <a:r>
-              <a:rPr lang="en-US" b="1" dirty="0" smtClean="0"/>
-              <a:t>Background Worker:</a:t>
+              <a:rPr lang="en-US" b="1" noProof="1" smtClean="0"/>
+              <a:t>Lista Task-uri:</a:t>
             </a:r>
           </a:p>
           <a:p>
@@ -5193,102 +6138,9 @@
               <a:buChar char="-"/>
             </a:pPr>
             <a:r>
-              <a:rPr lang="en-US" sz="1600" b="1" dirty="0" err="1" smtClean="0"/>
-              <a:t>CheckHumidityTresholds</a:t>
-            </a:r>
-            <a:r>
-              <a:rPr lang="en-US" sz="1600" b="1" dirty="0" smtClean="0"/>
-              <a:t>() </a:t>
-            </a:r>
-            <a:r>
-              <a:rPr lang="en-US" sz="1600" dirty="0" smtClean="0"/>
-              <a:t>– </a:t>
-            </a:r>
-            <a:r>
-              <a:rPr lang="en-US" sz="1400" i="1" dirty="0" err="1" smtClean="0"/>
-              <a:t>verifica</a:t>
-            </a:r>
-            <a:r>
-              <a:rPr lang="en-US" sz="1400" i="1" dirty="0" smtClean="0"/>
-              <a:t> </a:t>
-            </a:r>
-            <a:r>
-              <a:rPr lang="en-US" sz="1400" i="1" dirty="0" err="1" smtClean="0"/>
-              <a:t>daca</a:t>
-            </a:r>
-            <a:r>
-              <a:rPr lang="en-US" sz="1400" i="1" dirty="0" smtClean="0"/>
-              <a:t> </a:t>
-            </a:r>
-            <a:r>
-              <a:rPr lang="en-US" sz="1400" i="1" dirty="0" err="1" smtClean="0"/>
-              <a:t>noile</a:t>
-            </a:r>
-            <a:r>
-              <a:rPr lang="en-US" sz="1400" i="1" dirty="0" smtClean="0"/>
-              <a:t> </a:t>
-            </a:r>
-            <a:r>
-              <a:rPr lang="en-US" sz="1400" i="1" dirty="0" err="1" smtClean="0"/>
-              <a:t>valori</a:t>
-            </a:r>
-            <a:r>
-              <a:rPr lang="en-US" sz="1400" i="1" dirty="0" smtClean="0"/>
-              <a:t> </a:t>
-            </a:r>
-            <a:r>
-              <a:rPr lang="en-US" sz="1400" i="1" dirty="0" err="1" smtClean="0"/>
-              <a:t>colectate</a:t>
-            </a:r>
-            <a:r>
-              <a:rPr lang="en-US" sz="1400" i="1" dirty="0" smtClean="0"/>
-              <a:t> au </a:t>
-            </a:r>
-            <a:r>
-              <a:rPr lang="en-US" sz="1400" i="1" dirty="0" err="1" smtClean="0"/>
-              <a:t>trecut</a:t>
-            </a:r>
-            <a:r>
-              <a:rPr lang="en-US" sz="1400" i="1" dirty="0" smtClean="0"/>
-              <a:t> </a:t>
-            </a:r>
-            <a:r>
-              <a:rPr lang="en-US" sz="1400" i="1" dirty="0" err="1" smtClean="0"/>
-              <a:t>sau</a:t>
-            </a:r>
-            <a:r>
-              <a:rPr lang="en-US" sz="1400" i="1" dirty="0" smtClean="0"/>
-              <a:t> nu </a:t>
-            </a:r>
-            <a:r>
-              <a:rPr lang="en-US" sz="1400" i="1" dirty="0" err="1" smtClean="0"/>
-              <a:t>peste</a:t>
-            </a:r>
-            <a:r>
-              <a:rPr lang="en-US" sz="1400" i="1" dirty="0" smtClean="0"/>
-              <a:t> </a:t>
-            </a:r>
-            <a:r>
-              <a:rPr lang="en-US" sz="1400" i="1" dirty="0" err="1" smtClean="0"/>
-              <a:t>pragurile</a:t>
-            </a:r>
-            <a:r>
-              <a:rPr lang="en-US" sz="1400" i="1" dirty="0" smtClean="0"/>
-              <a:t> de </a:t>
-            </a:r>
-            <a:r>
-              <a:rPr lang="en-US" sz="1400" i="1" dirty="0" err="1" smtClean="0"/>
-              <a:t>umiditate</a:t>
-            </a:r>
-            <a:r>
-              <a:rPr lang="en-US" sz="1400" i="1" dirty="0" smtClean="0"/>
-              <a:t> </a:t>
-            </a:r>
-            <a:r>
-              <a:rPr lang="en-US" sz="1400" i="1" dirty="0" err="1" smtClean="0"/>
-              <a:t>stabilite</a:t>
-            </a:r>
-            <a:endParaRPr lang="en-US" sz="1400" i="1" dirty="0" smtClean="0"/>
+              <a:rPr lang="en-US" sz="1600" b="1" noProof="1" smtClean="0"/>
+              <a:t>FetchDatabaseVal()</a:t>
+            </a:r>
           </a:p>
           <a:p>
             <a:pPr marL="285750" indent="-285750">
@@ -5302,13 +6154,14 @@
               <a:buChar char="-"/>
             </a:pPr>
             <a:r>
-              <a:rPr lang="en-US" sz="1600" b="1" dirty="0" err="1"/>
-              <a:t>ManageIrrigationPumps</a:t>
-            </a:r>
-            <a:r>
-              <a:rPr lang="en-US" sz="1600" b="1" dirty="0"/>
-              <a:t>() </a:t>
-            </a:r>
+              <a:rPr lang="en-US" sz="1600" b="1" noProof="1" smtClean="0"/>
+              <a:t>AgoGenerateRandom</a:t>
+            </a:r>
+            <a:r>
+              <a:rPr lang="en-US" sz="1600" b="1" i="1" noProof="1" smtClean="0"/>
+              <a:t>(minVal,maxVal, pumpStatus)</a:t>
+            </a:r>
+            <a:endParaRPr lang="en-US" sz="1600" b="1" i="1" noProof="1" smtClean="0"/>
           </a:p>
           <a:p>
             <a:pPr marL="285750" indent="-285750">
@@ -5322,20 +6175,8 @@
               <a:buChar char="-"/>
             </a:pPr>
             <a:r>
-              <a:rPr lang="en-US" sz="1600" b="1" dirty="0" err="1" smtClean="0"/>
-              <a:t>RefreshHeatMapData</a:t>
-            </a:r>
-            <a:r>
-              <a:rPr lang="en-US" sz="1600" b="1" dirty="0" smtClean="0"/>
-              <a:t>() </a:t>
-            </a:r>
-            <a:r>
-              <a:rPr lang="en-US" sz="1600" i="1" dirty="0" smtClean="0"/>
-              <a:t>–</a:t>
-            </a:r>
-            <a:r>
-              <a:rPr lang="en-US" sz="1400" i="1" dirty="0" smtClean="0"/>
-              <a:t> refresh with current values</a:t>
+              <a:rPr lang="en-US" sz="1600" b="1" strike="sngStrike" noProof="1" smtClean="0"/>
+              <a:t>UploadValuesToCloud()</a:t>
             </a:r>
           </a:p>
           <a:p>
@@ -5350,54 +6191,736 @@
               <a:buChar char="-"/>
             </a:pPr>
             <a:r>
-              <a:rPr lang="en-US" sz="1600" b="1" dirty="0" err="1"/>
-              <a:t>FetchRandomValues</a:t>
-            </a:r>
-            <a:r>
-              <a:rPr lang="en-US" sz="1600" b="1" dirty="0" smtClean="0"/>
-              <a:t>() – </a:t>
-            </a:r>
-            <a:r>
-              <a:rPr lang="en-US" sz="1400" i="1" dirty="0" err="1" smtClean="0"/>
-              <a:t>colecteaza</a:t>
-            </a:r>
-            <a:r>
-              <a:rPr lang="en-US" sz="1400" i="1" dirty="0" smtClean="0"/>
+              <a:rPr lang="en-US" sz="1600" b="1" noProof="1" smtClean="0"/>
+              <a:t>SendToBackgroundWorker()</a:t>
+            </a:r>
+            <a:endParaRPr lang="en-US" sz="1600" b="1" noProof="1"/>
+          </a:p>
+        </p:txBody>
+      </p:sp>
+      <p:cxnSp>
+        <p:nvCxnSpPr>
+          <p:cNvPr id="13" name="Straight Arrow Connector 12"/>
+          <p:cNvCxnSpPr>
+            <a:stCxn id="6" idx="2"/>
+          </p:cNvCxnSpPr>
+          <p:nvPr/>
+        </p:nvCxnSpPr>
+        <p:spPr>
+          <a:xfrm>
+            <a:off x="1604051" y="1764225"/>
+            <a:ext cx="0" cy="890826"/>
+          </a:xfrm>
+          <a:prstGeom prst="straightConnector1">
+            <a:avLst/>
+          </a:prstGeom>
+          <a:ln w="22225">
+            <a:solidFill>
+              <a:schemeClr val="tx1"/>
+            </a:solidFill>
+            <a:tailEnd type="arrow"/>
+          </a:ln>
+        </p:spPr>
+        <p:style>
+          <a:lnRef idx="1">
+            <a:schemeClr val="accent1"/>
+          </a:lnRef>
+          <a:fillRef idx="0">
+            <a:schemeClr val="accent1"/>
+          </a:fillRef>
+          <a:effectRef idx="0">
+            <a:schemeClr val="accent1"/>
+          </a:effectRef>
+          <a:fontRef idx="minor">
+            <a:schemeClr val="tx1"/>
+          </a:fontRef>
+        </p:style>
+      </p:cxnSp>
+      <p:cxnSp>
+        <p:nvCxnSpPr>
+          <p:cNvPr id="14" name="Straight Arrow Connector 13"/>
+          <p:cNvCxnSpPr/>
+          <p:nvPr/>
+        </p:nvCxnSpPr>
+        <p:spPr>
+          <a:xfrm>
+            <a:off x="4637809" y="1795003"/>
+            <a:ext cx="0" cy="917138"/>
+          </a:xfrm>
+          <a:prstGeom prst="straightConnector1">
+            <a:avLst/>
+          </a:prstGeom>
+          <a:ln w="22225">
+            <a:solidFill>
+              <a:schemeClr val="tx1"/>
+            </a:solidFill>
+            <a:tailEnd type="arrow"/>
+          </a:ln>
+        </p:spPr>
+        <p:style>
+          <a:lnRef idx="1">
+            <a:schemeClr val="accent1"/>
+          </a:lnRef>
+          <a:fillRef idx="0">
+            <a:schemeClr val="accent1"/>
+          </a:fillRef>
+          <a:effectRef idx="0">
+            <a:schemeClr val="accent1"/>
+          </a:effectRef>
+          <a:fontRef idx="minor">
+            <a:schemeClr val="tx1"/>
+          </a:fontRef>
+        </p:style>
+      </p:cxnSp>
+      <p:cxnSp>
+        <p:nvCxnSpPr>
+          <p:cNvPr id="15" name="Straight Arrow Connector 14"/>
+          <p:cNvCxnSpPr/>
+          <p:nvPr/>
+        </p:nvCxnSpPr>
+        <p:spPr>
+          <a:xfrm>
+            <a:off x="7753479" y="1518004"/>
+            <a:ext cx="0" cy="901216"/>
+          </a:xfrm>
+          <a:prstGeom prst="straightConnector1">
+            <a:avLst/>
+          </a:prstGeom>
+          <a:ln w="22225">
+            <a:solidFill>
+              <a:schemeClr val="tx1"/>
+            </a:solidFill>
+            <a:tailEnd type="arrow"/>
+          </a:ln>
+        </p:spPr>
+        <p:style>
+          <a:lnRef idx="1">
+            <a:schemeClr val="accent1"/>
+          </a:lnRef>
+          <a:fillRef idx="0">
+            <a:schemeClr val="accent1"/>
+          </a:fillRef>
+          <a:effectRef idx="0">
+            <a:schemeClr val="accent1"/>
+          </a:effectRef>
+          <a:fontRef idx="minor">
+            <a:schemeClr val="tx1"/>
+          </a:fontRef>
+        </p:style>
+      </p:cxnSp>
+      <p:sp>
+        <p:nvSpPr>
+          <p:cNvPr id="16" name="TextBox 15"/>
+          <p:cNvSpPr txBox="1"/>
+          <p:nvPr/>
+        </p:nvSpPr>
+        <p:spPr>
+          <a:xfrm>
+            <a:off x="3203554" y="2636419"/>
+            <a:ext cx="3024375" cy="3836948"/>
+          </a:xfrm>
+          <a:prstGeom prst="rect">
+            <a:avLst/>
+          </a:prstGeom>
+          <a:noFill/>
+        </p:spPr>
+        <p:txBody>
+          <a:bodyPr wrap="square" rtlCol="0">
+            <a:spAutoFit/>
+          </a:bodyPr>
+          <a:lstStyle/>
+          <a:p>
+            <a:pPr>
+              <a:spcBef>
+                <a:spcPts val="200"/>
+              </a:spcBef>
+              <a:spcAft>
+                <a:spcPts val="200"/>
+              </a:spcAft>
+            </a:pPr>
+            <a:r>
+              <a:rPr lang="en-US" b="1" noProof="1" smtClean="0"/>
+              <a:t>Lista Task-uri:</a:t>
+            </a:r>
+          </a:p>
+          <a:p>
+            <a:pPr>
+              <a:spcBef>
+                <a:spcPts val="200"/>
+              </a:spcBef>
+              <a:spcAft>
+                <a:spcPts val="200"/>
+              </a:spcAft>
+            </a:pPr>
+            <a:endParaRPr lang="en-US" sz="1600" b="1" noProof="1" smtClean="0"/>
+          </a:p>
+          <a:p>
+            <a:pPr marL="285750" indent="-285750">
+              <a:spcBef>
+                <a:spcPts val="200"/>
+              </a:spcBef>
+              <a:spcAft>
+                <a:spcPts val="200"/>
+              </a:spcAft>
+              <a:buFontTx/>
+              <a:buChar char="-"/>
+            </a:pPr>
+            <a:r>
+              <a:rPr lang="en-US" sz="1600" b="1" noProof="1" smtClean="0"/>
+              <a:t>HeatMapDisplay()</a:t>
+            </a:r>
+          </a:p>
+          <a:p>
+            <a:pPr marL="285750" indent="-285750">
+              <a:spcBef>
+                <a:spcPts val="200"/>
+              </a:spcBef>
+              <a:spcAft>
+                <a:spcPts val="200"/>
+              </a:spcAft>
+              <a:buFontTx/>
+              <a:buChar char="-"/>
+            </a:pPr>
+            <a:r>
+              <a:rPr lang="en-US" sz="1600" b="1" noProof="1" smtClean="0"/>
+              <a:t>ProcessInfoFromDatabaseForMap()</a:t>
+            </a:r>
+            <a:endParaRPr lang="en-US" sz="1600" b="1" noProof="1" smtClean="0"/>
+          </a:p>
+          <a:p>
+            <a:pPr marL="285750" indent="-285750">
+              <a:spcBef>
+                <a:spcPts val="200"/>
+              </a:spcBef>
+              <a:spcAft>
+                <a:spcPts val="200"/>
+              </a:spcAft>
+              <a:buFontTx/>
+              <a:buChar char="-"/>
+            </a:pPr>
+            <a:r>
+              <a:rPr lang="en-US" sz="1600" b="1" noProof="1" smtClean="0"/>
+              <a:t>SetHumidityTreshold</a:t>
+            </a:r>
+            <a:r>
+              <a:rPr lang="en-US" sz="1600" b="1" noProof="1" smtClean="0"/>
+              <a:t>()</a:t>
+            </a:r>
+          </a:p>
+          <a:p>
+            <a:pPr marL="285750" indent="-285750">
+              <a:spcBef>
+                <a:spcPts val="200"/>
+              </a:spcBef>
+              <a:spcAft>
+                <a:spcPts val="200"/>
+              </a:spcAft>
+              <a:buFontTx/>
+              <a:buChar char="-"/>
+            </a:pPr>
+            <a:r>
+              <a:rPr lang="en-US" sz="1600" b="1" noProof="1" smtClean="0"/>
+              <a:t>SetHumidityFlag()</a:t>
+            </a:r>
+          </a:p>
+          <a:p>
+            <a:pPr marL="285750" indent="-285750">
+              <a:spcBef>
+                <a:spcPts val="200"/>
+              </a:spcBef>
+              <a:spcAft>
+                <a:spcPts val="200"/>
+              </a:spcAft>
+              <a:buFontTx/>
+              <a:buChar char="-"/>
+            </a:pPr>
+            <a:r>
+              <a:rPr lang="en-US" sz="1600" b="1" noProof="1" smtClean="0"/>
+              <a:t>UpdateHumidityFlag()</a:t>
+            </a:r>
+          </a:p>
+          <a:p>
+            <a:pPr marL="285750" indent="-285750">
+              <a:spcBef>
+                <a:spcPts val="200"/>
+              </a:spcBef>
+              <a:spcAft>
+                <a:spcPts val="200"/>
+              </a:spcAft>
+              <a:buFontTx/>
+              <a:buChar char="-"/>
+            </a:pPr>
+            <a:r>
+              <a:rPr lang="en-US" sz="1600" b="1" noProof="1" smtClean="0"/>
+              <a:t> DisplayHumidityFlags()</a:t>
+            </a:r>
+            <a:endParaRPr lang="en-US" sz="1600" b="1" noProof="1" smtClean="0"/>
+          </a:p>
+          <a:p>
+            <a:pPr marL="285750" indent="-285750">
+              <a:spcBef>
+                <a:spcPts val="200"/>
+              </a:spcBef>
+              <a:spcAft>
+                <a:spcPts val="200"/>
+              </a:spcAft>
+              <a:buFontTx/>
+              <a:buChar char="-"/>
+            </a:pPr>
+            <a:r>
+              <a:rPr lang="en-US" sz="900" b="1" strike="sngStrike" noProof="1" smtClean="0"/>
+              <a:t>Irrigate(</a:t>
+            </a:r>
+            <a:r>
+              <a:rPr lang="en-US" sz="900" b="1" i="1" strike="sngStrike" noProof="1" smtClean="0"/>
+              <a:t>area</a:t>
+            </a:r>
+            <a:r>
+              <a:rPr lang="en-US" sz="900" b="1" strike="sngStrike" noProof="1" smtClean="0"/>
+              <a:t>) </a:t>
+            </a:r>
+          </a:p>
+          <a:p>
+            <a:pPr marL="285750" indent="-285750">
+              <a:spcBef>
+                <a:spcPts val="200"/>
+              </a:spcBef>
+              <a:spcAft>
+                <a:spcPts val="200"/>
+              </a:spcAft>
+              <a:buFontTx/>
+              <a:buChar char="-"/>
+            </a:pPr>
+            <a:r>
+              <a:rPr lang="en-US" sz="900" b="1" strike="sngStrike" noProof="1" smtClean="0"/>
+              <a:t>StopIrigation(area) </a:t>
+            </a:r>
+          </a:p>
+          <a:p>
+            <a:pPr marL="285750" indent="-285750">
+              <a:spcBef>
+                <a:spcPts val="200"/>
+              </a:spcBef>
+              <a:spcAft>
+                <a:spcPts val="200"/>
+              </a:spcAft>
+              <a:buFontTx/>
+              <a:buChar char="-"/>
+            </a:pPr>
+            <a:r>
+              <a:rPr lang="en-US" sz="900" b="1" strike="sngStrike" noProof="1" smtClean="0"/>
+              <a:t>DelimitAreas() </a:t>
+            </a:r>
+          </a:p>
+          <a:p>
+            <a:pPr marL="285750" indent="-285750">
+              <a:spcBef>
+                <a:spcPts val="200"/>
+              </a:spcBef>
+              <a:spcAft>
+                <a:spcPts val="200"/>
+              </a:spcAft>
+              <a:buFontTx/>
+              <a:buChar char="-"/>
+            </a:pPr>
+            <a:r>
+              <a:rPr lang="en-US" sz="900" b="1" strike="sngStrike" noProof="1" smtClean="0"/>
+              <a:t>EraseArea()</a:t>
+            </a:r>
+          </a:p>
+          <a:p>
+            <a:pPr marL="285750" indent="-285750">
+              <a:spcBef>
+                <a:spcPts val="200"/>
+              </a:spcBef>
+              <a:spcAft>
+                <a:spcPts val="200"/>
+              </a:spcAft>
+              <a:buFontTx/>
+              <a:buChar char="-"/>
+            </a:pPr>
+            <a:r>
+              <a:rPr lang="en-US" sz="900" b="1" strike="sngStrike" noProof="1" smtClean="0"/>
+              <a:t>AddArea() </a:t>
+            </a:r>
+          </a:p>
+          <a:p>
+            <a:pPr marL="285750" indent="-285750">
+              <a:spcBef>
+                <a:spcPts val="200"/>
+              </a:spcBef>
+              <a:spcAft>
+                <a:spcPts val="200"/>
+              </a:spcAft>
+              <a:buFontTx/>
+              <a:buChar char="-"/>
+            </a:pPr>
+            <a:r>
+              <a:rPr lang="en-US" sz="900" b="1" strike="sngStrike" noProof="1" smtClean="0"/>
+              <a:t>UpdateArea()</a:t>
+            </a:r>
+            <a:endParaRPr lang="en-US" sz="900" b="1" strike="sngStrike" noProof="1"/>
+          </a:p>
+        </p:txBody>
+      </p:sp>
+      <p:sp>
+        <p:nvSpPr>
+          <p:cNvPr id="17" name="TextBox 16"/>
+          <p:cNvSpPr txBox="1"/>
+          <p:nvPr/>
+        </p:nvSpPr>
+        <p:spPr>
+          <a:xfrm>
+            <a:off x="-4549" y="2614529"/>
+            <a:ext cx="3208103" cy="2718693"/>
+          </a:xfrm>
+          <a:prstGeom prst="rect">
+            <a:avLst/>
+          </a:prstGeom>
+          <a:noFill/>
+        </p:spPr>
+        <p:txBody>
+          <a:bodyPr wrap="square" rtlCol="0">
+            <a:spAutoFit/>
+          </a:bodyPr>
+          <a:lstStyle/>
+          <a:p>
+            <a:pPr>
+              <a:spcBef>
+                <a:spcPts val="200"/>
+              </a:spcBef>
+              <a:spcAft>
+                <a:spcPts val="200"/>
+              </a:spcAft>
+            </a:pPr>
+            <a:r>
+              <a:rPr lang="en-US" b="1" noProof="1" smtClean="0"/>
+              <a:t>Lista Task - uri:</a:t>
+            </a:r>
+          </a:p>
+          <a:p>
+            <a:pPr>
+              <a:spcBef>
+                <a:spcPts val="200"/>
+              </a:spcBef>
+              <a:spcAft>
+                <a:spcPts val="200"/>
+              </a:spcAft>
+            </a:pPr>
+            <a:endParaRPr lang="en-US" sz="1600" b="1" noProof="1" smtClean="0"/>
+          </a:p>
+          <a:p>
+            <a:pPr marL="285750" indent="-285750">
+              <a:spcBef>
+                <a:spcPts val="300"/>
+              </a:spcBef>
+              <a:spcAft>
+                <a:spcPts val="300"/>
+              </a:spcAft>
+              <a:buFont typeface="Calibri" panose="020F0502020204030204" pitchFamily="34" charset="0"/>
+              <a:buChar char="⁻"/>
+            </a:pPr>
+            <a:endParaRPr lang="en-US" sz="1600" b="1" noProof="1" smtClean="0"/>
+          </a:p>
+          <a:p>
+            <a:pPr marL="285750" indent="-285750">
+              <a:spcBef>
+                <a:spcPts val="300"/>
+              </a:spcBef>
+              <a:spcAft>
+                <a:spcPts val="300"/>
+              </a:spcAft>
+              <a:buFont typeface="Calibri" panose="020F0502020204030204" pitchFamily="34" charset="0"/>
+              <a:buChar char="⁻"/>
+            </a:pPr>
+            <a:r>
+              <a:rPr lang="en-US" sz="1600" b="1" noProof="1" smtClean="0"/>
+              <a:t>FetchRandomValues()</a:t>
+            </a:r>
+          </a:p>
+          <a:p>
+            <a:pPr marL="285750" indent="-285750">
+              <a:spcBef>
+                <a:spcPts val="300"/>
+              </a:spcBef>
+              <a:spcAft>
+                <a:spcPts val="300"/>
+              </a:spcAft>
+              <a:buFont typeface="Calibri" panose="020F0502020204030204" pitchFamily="34" charset="0"/>
+              <a:buChar char="⁻"/>
+            </a:pPr>
+            <a:r>
+              <a:rPr lang="en-US" sz="1600" b="1" noProof="1" smtClean="0"/>
+              <a:t>CheckHumidityTresholds() – </a:t>
+            </a:r>
+            <a:r>
+              <a:rPr lang="en-US" sz="1400" b="1" noProof="1" smtClean="0"/>
+              <a:t>(=&gt;opresteApa, PornesteApa)</a:t>
+            </a:r>
+          </a:p>
+          <a:p>
+            <a:pPr>
+              <a:spcBef>
+                <a:spcPts val="300"/>
+              </a:spcBef>
+              <a:spcAft>
+                <a:spcPts val="300"/>
+              </a:spcAft>
+            </a:pPr>
+            <a:r>
+              <a:rPr lang="en-US" sz="1600" b="1" noProof="1" smtClean="0"/>
+              <a:t>-    ManageIrrigationPumps()</a:t>
+            </a:r>
+          </a:p>
+          <a:p>
+            <a:pPr marL="285750" indent="-285750">
+              <a:spcBef>
+                <a:spcPts val="200"/>
+              </a:spcBef>
+              <a:spcAft>
+                <a:spcPts val="200"/>
+              </a:spcAft>
+              <a:buFontTx/>
+              <a:buChar char="-"/>
+            </a:pPr>
+            <a:r>
+              <a:rPr lang="en-US" sz="1600" b="1" noProof="1" smtClean="0"/>
+              <a:t>UpdateDatabaseWithRealTimeValues()</a:t>
+            </a:r>
+            <a:endParaRPr lang="en-US" sz="1600" b="1" noProof="1" smtClean="0"/>
+          </a:p>
+        </p:txBody>
+      </p:sp>
+      <p:sp>
+        <p:nvSpPr>
+          <p:cNvPr id="2" name="Title 1"/>
+          <p:cNvSpPr>
+            <a:spLocks noGrp="1"/>
+          </p:cNvSpPr>
+          <p:nvPr>
+            <p:ph type="title"/>
+          </p:nvPr>
+        </p:nvSpPr>
+        <p:spPr>
+          <a:xfrm>
+            <a:off x="2209800" y="274638"/>
+            <a:ext cx="3602182" cy="639762"/>
+          </a:xfrm>
+        </p:spPr>
+        <p:txBody>
+          <a:bodyPr>
+            <a:noAutofit/>
+          </a:bodyPr>
+          <a:lstStyle/>
+          <a:p>
+            <a:r>
+              <a:rPr lang="en-US" sz="4400" b="1" dirty="0" err="1" smtClean="0"/>
+              <a:t>Detalii</a:t>
+            </a:r>
+            <a:endParaRPr lang="en-US" sz="4400" b="1" dirty="0"/>
+          </a:p>
+        </p:txBody>
+      </p:sp>
+    </p:spTree>
+    <p:extLst>
+      <p:ext uri="{BB962C8B-B14F-4D97-AF65-F5344CB8AC3E}">
+        <p14:creationId xmlns:p14="http://schemas.microsoft.com/office/powerpoint/2010/main" val="3683697301"/>
+      </p:ext>
+    </p:extLst>
+  </p:cSld>
+  <p:clrMapOvr>
+    <a:masterClrMapping/>
+  </p:clrMapOvr>
+  <p:timing>
+    <p:tnLst>
+      <p:par>
+        <p:cTn id="1" dur="indefinite" restart="never" nodeType="tmRoot"/>
+      </p:par>
+    </p:tnLst>
+  </p:timing>
+</p:sld>
+</file>
+
+<file path=ppt/slides/slide7.xml><?xml version="1.0" encoding="utf-8"?>
+<p:sld xmlns:a="http://schemas.openxmlformats.org/drawingml/2006/main" xmlns:r="http://schemas.openxmlformats.org/officeDocument/2006/relationships" xmlns:p="http://schemas.openxmlformats.org/presentationml/2006/main">
+  <p:cSld>
+    <p:spTree>
+      <p:nvGrpSpPr>
+        <p:cNvPr id="1" name=""/>
+        <p:cNvGrpSpPr/>
+        <p:nvPr/>
+      </p:nvGrpSpPr>
+      <p:grpSpPr>
+        <a:xfrm>
+          <a:off x="0" y="0"/>
+          <a:ext cx="0" cy="0"/>
+          <a:chOff x="0" y="0"/>
+          <a:chExt cx="0" cy="0"/>
+        </a:xfrm>
+      </p:grpSpPr>
+      <p:sp>
+        <p:nvSpPr>
+          <p:cNvPr id="4" name="TextBox 3"/>
+          <p:cNvSpPr txBox="1"/>
+          <p:nvPr/>
+        </p:nvSpPr>
+        <p:spPr>
+          <a:xfrm>
+            <a:off x="34402" y="11798"/>
+            <a:ext cx="9109598" cy="2985433"/>
+          </a:xfrm>
+          <a:prstGeom prst="rect">
+            <a:avLst/>
+          </a:prstGeom>
+          <a:noFill/>
+        </p:spPr>
+        <p:txBody>
+          <a:bodyPr wrap="square" rtlCol="0">
+            <a:spAutoFit/>
+          </a:bodyPr>
+          <a:lstStyle/>
+          <a:p>
+            <a:pPr>
+              <a:spcBef>
+                <a:spcPts val="600"/>
+              </a:spcBef>
+              <a:spcAft>
+                <a:spcPts val="600"/>
+              </a:spcAft>
+            </a:pPr>
+            <a:r>
+              <a:rPr lang="en-US" b="1" noProof="1" smtClean="0"/>
+              <a:t>Background Worker:</a:t>
+            </a:r>
+          </a:p>
+          <a:p>
+            <a:pPr marL="285750" indent="-285750">
+              <a:spcBef>
+                <a:spcPts val="600"/>
+              </a:spcBef>
+              <a:spcAft>
+                <a:spcPts val="600"/>
+              </a:spcAft>
+              <a:buFontTx/>
+              <a:buChar char="-"/>
+            </a:pPr>
+            <a:r>
+              <a:rPr lang="en-US" sz="1600" b="1" noProof="1" smtClean="0"/>
+              <a:t>CheckHumidityTresholds() </a:t>
+            </a:r>
+            <a:r>
+              <a:rPr lang="en-US" sz="1600" noProof="1" smtClean="0"/>
+              <a:t>– </a:t>
+            </a:r>
+            <a:r>
+              <a:rPr lang="en-US" sz="1400" i="1" noProof="1" smtClean="0"/>
+              <a:t>verifica daca noile valori colectate au trecut sau nu peste pragurile de umiditate stabilite</a:t>
+            </a:r>
+          </a:p>
+          <a:p>
+            <a:pPr marL="285750" indent="-285750">
+              <a:spcBef>
+                <a:spcPts val="600"/>
+              </a:spcBef>
+              <a:spcAft>
+                <a:spcPts val="600"/>
+              </a:spcAft>
+              <a:buFontTx/>
+              <a:buChar char="-"/>
+            </a:pPr>
+            <a:r>
+              <a:rPr lang="en-US" sz="1600" b="1" noProof="1" smtClean="0"/>
+              <a:t>ManageIrrigationPumps() </a:t>
+            </a:r>
+          </a:p>
+          <a:p>
+            <a:pPr marL="285750" indent="-285750">
+              <a:spcBef>
+                <a:spcPts val="600"/>
+              </a:spcBef>
+              <a:spcAft>
+                <a:spcPts val="600"/>
+              </a:spcAft>
+              <a:buFontTx/>
+              <a:buChar char="-"/>
+            </a:pPr>
+            <a:r>
+              <a:rPr lang="en-US" sz="1600" b="1" noProof="1" smtClean="0"/>
+              <a:t>RefreshHeatMapData() </a:t>
+            </a:r>
+            <a:r>
+              <a:rPr lang="en-US" sz="1600" i="1" noProof="1" smtClean="0"/>
+              <a:t>–</a:t>
+            </a:r>
+            <a:r>
+              <a:rPr lang="en-US" sz="1400" i="1" noProof="1" smtClean="0"/>
+              <a:t> refresh with current values</a:t>
+            </a:r>
+          </a:p>
+          <a:p>
+            <a:pPr marL="285750" indent="-285750">
+              <a:spcBef>
+                <a:spcPts val="600"/>
+              </a:spcBef>
+              <a:spcAft>
+                <a:spcPts val="600"/>
+              </a:spcAft>
+              <a:buFontTx/>
+              <a:buChar char="-"/>
+            </a:pPr>
+            <a:r>
+              <a:rPr lang="en-US" sz="1600" b="1" noProof="1" smtClean="0"/>
+              <a:t>FetchRandomValues() – </a:t>
+            </a:r>
+            <a:r>
+              <a:rPr lang="en-US" sz="1400" i="1" noProof="1" smtClean="0"/>
+              <a:t>colecteaza valorile random uploadate de generatorul de </a:t>
+            </a:r>
+            <a:r>
+              <a:rPr lang="en-US" sz="1400" i="1" noProof="1" smtClean="0"/>
+              <a:t>valori </a:t>
+            </a:r>
+            <a:r>
+              <a:rPr lang="en-US" sz="1400" i="1" noProof="1" smtClean="0"/>
+              <a:t>random</a:t>
+            </a:r>
+          </a:p>
+          <a:p>
+            <a:pPr>
+              <a:spcBef>
+                <a:spcPts val="200"/>
+              </a:spcBef>
+              <a:spcAft>
+                <a:spcPts val="200"/>
+              </a:spcAft>
+            </a:pPr>
+            <a:r>
+              <a:rPr lang="en-US" sz="1400" b="1" i="1" noProof="1"/>
               <a:t> </a:t>
             </a:r>
             <a:r>
-              <a:rPr lang="en-US" sz="1400" i="1" dirty="0" err="1" smtClean="0"/>
-              <a:t>valorile</a:t>
-            </a:r>
-            <a:r>
-              <a:rPr lang="en-US" sz="1400" i="1" dirty="0" smtClean="0"/>
-              <a:t> random </a:t>
-            </a:r>
-            <a:r>
-              <a:rPr lang="en-US" sz="1400" i="1" dirty="0" err="1" smtClean="0"/>
-              <a:t>uploadate</a:t>
-            </a:r>
-            <a:r>
-              <a:rPr lang="en-US" sz="1400" i="1" dirty="0" smtClean="0"/>
-              <a:t> de </a:t>
-            </a:r>
-            <a:r>
-              <a:rPr lang="en-US" sz="1400" i="1" dirty="0" err="1" smtClean="0"/>
-              <a:t>generatorul</a:t>
-            </a:r>
-            <a:r>
-              <a:rPr lang="en-US" sz="1400" i="1" dirty="0" smtClean="0"/>
-              <a:t> de </a:t>
-            </a:r>
-            <a:r>
-              <a:rPr lang="en-US" sz="1400" i="1" dirty="0" err="1" smtClean="0"/>
-              <a:t>valori</a:t>
-            </a:r>
-            <a:r>
-              <a:rPr lang="en-US" sz="1400" i="1" dirty="0" smtClean="0"/>
-              <a:t> random</a:t>
-            </a:r>
-            <a:endParaRPr lang="en-US" sz="1600" b="1" dirty="0"/>
+              <a:rPr lang="en-US" sz="1400" b="1" i="1" noProof="1" smtClean="0"/>
+              <a:t>       </a:t>
+            </a:r>
+            <a:r>
+              <a:rPr lang="en-US" sz="1400" b="1" i="1" noProof="1" smtClean="0"/>
+              <a:t>Background worker trebuie sa updateze baza de date cu valorile curente de umiditate, care vor fi selectate si folosite in afisarea </a:t>
+            </a:r>
+          </a:p>
+          <a:p>
+            <a:pPr>
+              <a:spcBef>
+                <a:spcPts val="200"/>
+              </a:spcBef>
+              <a:spcAft>
+                <a:spcPts val="200"/>
+              </a:spcAft>
+            </a:pPr>
+            <a:r>
+              <a:rPr lang="en-US" sz="1400" b="1" i="1" noProof="1" smtClean="0"/>
+              <a:t>Hartilor in Web Application</a:t>
+            </a:r>
+            <a:endParaRPr lang="en-US" sz="1600" b="1" noProof="1"/>
           </a:p>
         </p:txBody>
       </p:sp>
@@ -5866,7 +7389,7 @@
 </p:sld>
 </file>
 
-<file path=ppt/slides/slide5.xml><?xml version="1.0" encoding="utf-8"?>
+<file path=ppt/slides/slide8.xml><?xml version="1.0" encoding="utf-8"?>
 <p:sld xmlns:a="http://schemas.openxmlformats.org/drawingml/2006/main" xmlns:r="http://schemas.openxmlformats.org/officeDocument/2006/relationships" xmlns:p="http://schemas.openxmlformats.org/presentationml/2006/main">
   <p:cSld>
     <p:spTree>
@@ -5892,7 +7415,7 @@
         <p:spPr>
           <a:xfrm>
             <a:off x="344606" y="152400"/>
-            <a:ext cx="7122994" cy="4985980"/>
+            <a:ext cx="7122994" cy="6709529"/>
           </a:xfrm>
           <a:prstGeom prst="rect">
             <a:avLst/>
@@ -5914,13 +7437,14 @@
               </a:spcAft>
             </a:pPr>
             <a:r>
-              <a:rPr lang="en-US" b="1" dirty="0" err="1" smtClean="0"/>
-              <a:t>Aplicatie</a:t>
-            </a:r>
-            <a:r>
-              <a:rPr lang="en-US" b="1" dirty="0" smtClean="0"/>
-              <a:t> Web/Mobile:</a:t>
-            </a:r>
+              <a:rPr lang="en-US" b="1" noProof="1" smtClean="0"/>
+              <a:t>Aplicatie </a:t>
+            </a:r>
+            <a:r>
+              <a:rPr lang="en-US" b="1" noProof="1" smtClean="0"/>
+              <a:t>Web:</a:t>
+            </a:r>
+            <a:endParaRPr lang="en-US" b="1" noProof="1" smtClean="0"/>
           </a:p>
           <a:p>
             <a:pPr marL="285750" indent="-285750">
@@ -5934,96 +7458,12 @@
               <a:buChar char="-"/>
             </a:pPr>
             <a:r>
-              <a:rPr lang="en-US" sz="1600" b="1" dirty="0" err="1" smtClean="0"/>
-              <a:t>SetHumidityArea</a:t>
-            </a:r>
-            <a:r>
-              <a:rPr lang="en-US" sz="1600" b="1" dirty="0" smtClean="0"/>
-              <a:t>() </a:t>
-            </a:r>
-            <a:r>
-              <a:rPr lang="en-US" sz="1400" i="1" dirty="0" smtClean="0"/>
-              <a:t>– </a:t>
-            </a:r>
-            <a:r>
-              <a:rPr lang="en-US" sz="1400" i="1" dirty="0" err="1" smtClean="0"/>
-              <a:t>seteaza</a:t>
-            </a:r>
-            <a:r>
-              <a:rPr lang="en-US" sz="1400" i="1" dirty="0" smtClean="0"/>
-              <a:t> </a:t>
-            </a:r>
-            <a:r>
-              <a:rPr lang="en-US" sz="1400" i="1" dirty="0" err="1" smtClean="0"/>
-              <a:t>ce</a:t>
-            </a:r>
-            <a:r>
-              <a:rPr lang="en-US" sz="1400" i="1" dirty="0" smtClean="0"/>
-              <a:t> flag </a:t>
-            </a:r>
-            <a:r>
-              <a:rPr lang="en-US" sz="1400" i="1" dirty="0" err="1" smtClean="0"/>
-              <a:t>va</a:t>
-            </a:r>
-            <a:r>
-              <a:rPr lang="en-US" sz="1400" i="1" dirty="0" smtClean="0"/>
-              <a:t> </a:t>
-            </a:r>
-            <a:r>
-              <a:rPr lang="en-US" sz="1400" i="1" dirty="0" err="1" smtClean="0"/>
-              <a:t>corespunde</a:t>
-            </a:r>
-            <a:r>
-              <a:rPr lang="en-US" sz="1400" i="1" dirty="0" smtClean="0"/>
-              <a:t> </a:t>
-            </a:r>
-            <a:r>
-              <a:rPr lang="en-US" sz="1400" i="1" dirty="0" err="1" smtClean="0"/>
-              <a:t>carei</a:t>
-            </a:r>
-            <a:r>
-              <a:rPr lang="en-US" sz="1400" i="1" dirty="0" smtClean="0"/>
-              <a:t> zone (zona x </a:t>
-            </a:r>
-            <a:r>
-              <a:rPr lang="en-US" sz="1400" i="1" dirty="0" err="1" smtClean="0"/>
-              <a:t>va</a:t>
-            </a:r>
-            <a:r>
-              <a:rPr lang="en-US" sz="1400" i="1" dirty="0" smtClean="0"/>
-              <a:t> fi </a:t>
-            </a:r>
-            <a:r>
-              <a:rPr lang="en-US" sz="1400" i="1" dirty="0" err="1" smtClean="0"/>
-              <a:t>uscata</a:t>
-            </a:r>
-            <a:r>
-              <a:rPr lang="en-US" sz="1400" i="1" dirty="0" smtClean="0"/>
-              <a:t>, zona Y </a:t>
-            </a:r>
-            <a:r>
-              <a:rPr lang="en-US" sz="1400" i="1" dirty="0" err="1" smtClean="0"/>
-              <a:t>va</a:t>
-            </a:r>
-            <a:r>
-              <a:rPr lang="en-US" sz="1400" i="1" dirty="0" smtClean="0"/>
-              <a:t> fi </a:t>
-            </a:r>
-            <a:r>
-              <a:rPr lang="en-US" sz="1400" i="1" dirty="0" err="1" smtClean="0"/>
-              <a:t>umeda</a:t>
-            </a:r>
-            <a:r>
-              <a:rPr lang="en-US" sz="1400" i="1" dirty="0" smtClean="0"/>
-              <a:t>, </a:t>
-            </a:r>
-            <a:r>
-              <a:rPr lang="en-US" sz="1400" i="1" dirty="0" err="1" smtClean="0"/>
-              <a:t>etc</a:t>
-            </a:r>
-            <a:r>
-              <a:rPr lang="en-US" sz="1400" i="1" dirty="0" smtClean="0"/>
-              <a:t>)</a:t>
+              <a:rPr lang="en-US" sz="1600" b="1" noProof="1" smtClean="0"/>
+              <a:t>SetHumidityTreshold() - </a:t>
+            </a:r>
+            <a:r>
+              <a:rPr lang="en-US" sz="1600" noProof="1" smtClean="0"/>
+              <a:t> setare ce grad de umiditate corespunde carui interval de umiditate. (Ex. : Grad 1: 0-19% interval de umiditate)</a:t>
             </a:r>
           </a:p>
           <a:p>
@@ -6038,207 +7478,34 @@
               <a:buChar char="-"/>
             </a:pPr>
             <a:r>
-              <a:rPr lang="en-US" sz="1600" b="1" dirty="0" err="1" smtClean="0"/>
-              <a:t>HeatMapDisplay</a:t>
-            </a:r>
-            <a:r>
-              <a:rPr lang="en-US" sz="1600" b="1" dirty="0"/>
-              <a:t>() </a:t>
-            </a:r>
-            <a:r>
-              <a:rPr lang="en-US" sz="1400" i="1" dirty="0"/>
-              <a:t>using Google Maps </a:t>
-            </a:r>
-            <a:r>
-              <a:rPr lang="en-US" sz="1400" i="1" dirty="0" smtClean="0"/>
-              <a:t>Platform – </a:t>
-            </a:r>
-            <a:r>
-              <a:rPr lang="en-US" sz="1400" i="1" dirty="0" err="1" smtClean="0"/>
-              <a:t>Vizualizare</a:t>
-            </a:r>
-            <a:r>
-              <a:rPr lang="en-US" sz="1400" i="1" dirty="0" smtClean="0"/>
-              <a:t> </a:t>
-            </a:r>
-            <a:r>
-              <a:rPr lang="en-US" sz="1400" i="1" dirty="0" err="1" smtClean="0"/>
-              <a:t>pe</a:t>
-            </a:r>
-            <a:r>
-              <a:rPr lang="en-US" sz="1400" i="1" dirty="0" smtClean="0"/>
-              <a:t> zone in google maps, </a:t>
-            </a:r>
-            <a:r>
-              <a:rPr lang="en-US" sz="1400" i="1" dirty="0" err="1" smtClean="0"/>
-              <a:t>impreuna</a:t>
-            </a:r>
-            <a:r>
-              <a:rPr lang="en-US" sz="1400" i="1" dirty="0" smtClean="0"/>
-              <a:t> cu </a:t>
-            </a:r>
-            <a:r>
-              <a:rPr lang="en-US" sz="1400" i="1" dirty="0" err="1" smtClean="0"/>
-              <a:t>starea</a:t>
-            </a:r>
-            <a:r>
-              <a:rPr lang="en-US" sz="1400" i="1" dirty="0" smtClean="0"/>
-              <a:t> </a:t>
-            </a:r>
-            <a:r>
-              <a:rPr lang="en-US" sz="1400" i="1" dirty="0" err="1" smtClean="0"/>
-              <a:t>pentru</a:t>
-            </a:r>
-            <a:r>
-              <a:rPr lang="en-US" sz="1400" i="1" dirty="0" smtClean="0"/>
-              <a:t> </a:t>
-            </a:r>
-            <a:r>
-              <a:rPr lang="en-US" sz="1400" i="1" dirty="0" err="1" smtClean="0"/>
-              <a:t>fiecare</a:t>
-            </a:r>
-            <a:r>
-              <a:rPr lang="en-US" sz="1400" i="1" dirty="0" smtClean="0"/>
-              <a:t> zona</a:t>
-            </a:r>
-          </a:p>
-          <a:p>
-            <a:pPr marL="285750" indent="-285750">
-              <a:buFontTx/>
-              <a:buChar char="-"/>
-            </a:pPr>
-            <a:r>
-              <a:rPr lang="en-US" sz="1600" b="1" dirty="0" err="1" smtClean="0"/>
-              <a:t>SetHumidityIntervals</a:t>
-            </a:r>
-            <a:r>
-              <a:rPr lang="en-US" sz="1600" b="1" dirty="0" smtClean="0"/>
-              <a:t>/Domain() </a:t>
-            </a:r>
-            <a:r>
-              <a:rPr lang="en-US" sz="1400" i="1" dirty="0" smtClean="0"/>
-              <a:t>– </a:t>
-            </a:r>
-            <a:r>
-              <a:rPr lang="en-US" sz="1400" i="1" dirty="0" err="1" smtClean="0"/>
-              <a:t>seteaza</a:t>
-            </a:r>
-            <a:r>
-              <a:rPr lang="en-US" sz="1400" i="1" dirty="0" smtClean="0"/>
-              <a:t> </a:t>
-            </a:r>
-            <a:r>
-              <a:rPr lang="en-US" sz="1400" i="1" dirty="0" err="1" smtClean="0"/>
-              <a:t>valorile</a:t>
-            </a:r>
-            <a:r>
-              <a:rPr lang="en-US" sz="1400" i="1" dirty="0" smtClean="0"/>
-              <a:t> </a:t>
-            </a:r>
-            <a:r>
-              <a:rPr lang="en-US" sz="1400" i="1" dirty="0" err="1" smtClean="0"/>
-              <a:t>intre</a:t>
-            </a:r>
-            <a:r>
-              <a:rPr lang="en-US" sz="1400" i="1" dirty="0" smtClean="0"/>
-              <a:t> care </a:t>
-            </a:r>
-            <a:r>
-              <a:rPr lang="en-US" sz="1400" i="1" dirty="0" err="1" smtClean="0"/>
-              <a:t>solul</a:t>
-            </a:r>
-            <a:r>
-              <a:rPr lang="en-US" sz="1400" i="1" dirty="0" smtClean="0"/>
-              <a:t> </a:t>
-            </a:r>
-            <a:r>
-              <a:rPr lang="en-US" sz="1400" i="1" dirty="0" err="1" smtClean="0"/>
-              <a:t>este</a:t>
-            </a:r>
-            <a:r>
-              <a:rPr lang="en-US" sz="1400" i="1" dirty="0" smtClean="0"/>
-              <a:t> </a:t>
-            </a:r>
-            <a:r>
-              <a:rPr lang="en-US" sz="1400" i="1" dirty="0" err="1" smtClean="0"/>
-              <a:t>uscat</a:t>
-            </a:r>
-            <a:r>
-              <a:rPr lang="en-US" sz="1400" i="1" dirty="0" smtClean="0"/>
-              <a:t>, </a:t>
-            </a:r>
-            <a:r>
-              <a:rPr lang="en-US" sz="1400" i="1" dirty="0" err="1" smtClean="0"/>
-              <a:t>umed</a:t>
-            </a:r>
-            <a:r>
-              <a:rPr lang="en-US" sz="1400" i="1" dirty="0" smtClean="0"/>
-              <a:t> </a:t>
-            </a:r>
-            <a:r>
-              <a:rPr lang="en-US" sz="1400" i="1" dirty="0" err="1" smtClean="0"/>
-              <a:t>si</a:t>
-            </a:r>
-            <a:r>
-              <a:rPr lang="en-US" sz="1400" i="1" dirty="0" smtClean="0"/>
-              <a:t> </a:t>
-            </a:r>
-            <a:r>
-              <a:rPr lang="en-US" sz="1400" i="1" dirty="0" err="1" smtClean="0"/>
-              <a:t>suprasaturat</a:t>
-            </a:r>
-            <a:r>
-              <a:rPr lang="en-US" sz="1400" i="1" dirty="0" smtClean="0"/>
-              <a:t>. (</a:t>
-            </a:r>
-            <a:r>
-              <a:rPr lang="en-US" sz="1400" i="1" dirty="0" err="1" smtClean="0"/>
-              <a:t>intre</a:t>
-            </a:r>
-            <a:r>
-              <a:rPr lang="en-US" sz="1400" i="1" dirty="0" smtClean="0"/>
-              <a:t> value x </a:t>
-            </a:r>
-            <a:r>
-              <a:rPr lang="en-US" sz="1400" i="1" dirty="0" err="1" smtClean="0"/>
-              <a:t>si</a:t>
-            </a:r>
-            <a:r>
-              <a:rPr lang="en-US" sz="1400" i="1" dirty="0" smtClean="0"/>
-              <a:t> y =&gt; sol </a:t>
-            </a:r>
-            <a:r>
-              <a:rPr lang="en-US" sz="1400" i="1" dirty="0" err="1" smtClean="0"/>
-              <a:t>uscat</a:t>
-            </a:r>
-            <a:r>
-              <a:rPr lang="en-US" sz="1400" i="1" dirty="0" smtClean="0"/>
-              <a:t>, </a:t>
-            </a:r>
-            <a:r>
-              <a:rPr lang="en-US" sz="1400" i="1" dirty="0" err="1" smtClean="0"/>
-              <a:t>umed</a:t>
-            </a:r>
-            <a:r>
-              <a:rPr lang="en-US" sz="1400" i="1" dirty="0" smtClean="0"/>
-              <a:t> </a:t>
-            </a:r>
-            <a:r>
-              <a:rPr lang="en-US" sz="1400" i="1" dirty="0" err="1" smtClean="0"/>
-              <a:t>sau</a:t>
-            </a:r>
-            <a:r>
-              <a:rPr lang="en-US" sz="1400" i="1" dirty="0" smtClean="0"/>
-              <a:t> </a:t>
-            </a:r>
-            <a:r>
-              <a:rPr lang="en-US" sz="1400" i="1" dirty="0" err="1" smtClean="0"/>
-              <a:t>suprasaturat</a:t>
-            </a:r>
-            <a:r>
-              <a:rPr lang="en-US" sz="1400" i="1" dirty="0" smtClean="0"/>
-              <a:t>)</a:t>
-            </a:r>
+              <a:rPr lang="en-US" sz="1600" b="1" noProof="1"/>
+              <a:t>HeatMapDisplay() </a:t>
+            </a:r>
+            <a:r>
+              <a:rPr lang="en-US" sz="1600" i="1" noProof="1"/>
+              <a:t>using Google Maps Platform – </a:t>
+            </a:r>
+            <a:r>
+              <a:rPr lang="en-US" sz="1600" i="1" noProof="1"/>
+              <a:t>Vizualizare </a:t>
+            </a:r>
+            <a:r>
+              <a:rPr lang="en-US" sz="1600" i="1" noProof="1" smtClean="0"/>
+              <a:t>parcele  in </a:t>
+            </a:r>
+            <a:r>
+              <a:rPr lang="en-US" sz="1600" i="1" noProof="1"/>
+              <a:t>google maps, impreuna cu starea pentru </a:t>
+            </a:r>
+            <a:r>
+              <a:rPr lang="en-US" sz="1600" i="1" noProof="1"/>
+              <a:t>fiecare </a:t>
+            </a:r>
+            <a:r>
+              <a:rPr lang="en-US" sz="1600" i="1" noProof="1" smtClean="0"/>
+              <a:t>zona (nume parcela, stare pompa, grad asignat de umiditate si gradul curent de umiditate + valorile de umiditate asteptate si curente)</a:t>
+            </a:r>
+            <a:endParaRPr lang="en-US" sz="1600" b="1" noProof="1"/>
           </a:p>
           <a:p>
             <a:pPr marL="285750" indent="-285750">
@@ -6252,82 +7519,29 @@
               <a:buChar char="-"/>
             </a:pPr>
             <a:r>
-              <a:rPr lang="en-US" sz="1600" b="1" dirty="0" smtClean="0"/>
-              <a:t>Irrigate(</a:t>
-            </a:r>
-            <a:r>
-              <a:rPr lang="en-US" sz="1600" b="1" i="1" dirty="0" smtClean="0"/>
-              <a:t>area</a:t>
-            </a:r>
-            <a:r>
-              <a:rPr lang="en-US" sz="1600" b="1" dirty="0" smtClean="0"/>
-              <a:t>) – </a:t>
-            </a:r>
-            <a:r>
-              <a:rPr lang="en-US" sz="1400" i="1" dirty="0" smtClean="0"/>
-              <a:t>da </a:t>
-            </a:r>
-            <a:r>
-              <a:rPr lang="en-US" sz="1400" i="1" dirty="0" err="1" smtClean="0"/>
-              <a:t>comanda</a:t>
-            </a:r>
-            <a:r>
-              <a:rPr lang="en-US" sz="1400" i="1" dirty="0" smtClean="0"/>
-              <a:t> </a:t>
-            </a:r>
-            <a:r>
-              <a:rPr lang="en-US" sz="1400" i="1" dirty="0" err="1" smtClean="0"/>
-              <a:t>pentru</a:t>
-            </a:r>
-            <a:r>
-              <a:rPr lang="en-US" sz="1400" i="1" dirty="0" smtClean="0"/>
-              <a:t> a </a:t>
-            </a:r>
-            <a:r>
-              <a:rPr lang="en-US" sz="1400" i="1" dirty="0" err="1" smtClean="0"/>
-              <a:t>iriga</a:t>
-            </a:r>
-            <a:r>
-              <a:rPr lang="en-US" sz="1400" i="1" dirty="0" smtClean="0"/>
-              <a:t> o </a:t>
-            </a:r>
-            <a:r>
-              <a:rPr lang="en-US" sz="1400" i="1" dirty="0" err="1" smtClean="0"/>
-              <a:t>anumita</a:t>
-            </a:r>
-            <a:r>
-              <a:rPr lang="en-US" sz="1400" i="1" dirty="0" smtClean="0"/>
-              <a:t> zona </a:t>
-            </a:r>
-            <a:r>
-              <a:rPr lang="en-US" sz="1400" i="1" dirty="0" err="1" smtClean="0"/>
-              <a:t>pana</a:t>
-            </a:r>
-            <a:r>
-              <a:rPr lang="en-US" sz="1400" i="1" dirty="0" smtClean="0"/>
-              <a:t> se </a:t>
-            </a:r>
-            <a:r>
-              <a:rPr lang="en-US" sz="1400" i="1" dirty="0" err="1" smtClean="0"/>
-              <a:t>indeplinesc</a:t>
-            </a:r>
-            <a:r>
-              <a:rPr lang="en-US" sz="1400" i="1" dirty="0" smtClean="0"/>
-              <a:t> </a:t>
-            </a:r>
-            <a:r>
-              <a:rPr lang="en-US" sz="1400" i="1" dirty="0" err="1" smtClean="0"/>
-              <a:t>anumite</a:t>
-            </a:r>
-            <a:r>
-              <a:rPr lang="en-US" sz="1400" i="1" dirty="0" smtClean="0"/>
-              <a:t> </a:t>
-            </a:r>
-            <a:r>
-              <a:rPr lang="en-US" sz="1400" i="1" dirty="0" err="1" smtClean="0"/>
-              <a:t>conditii</a:t>
-            </a:r>
-            <a:endParaRPr lang="en-US" sz="1600" b="1" i="1" dirty="0"/>
+              <a:rPr lang="en-US" sz="1600" b="1" noProof="1" smtClean="0"/>
+              <a:t>SetHumidityFlag() </a:t>
+            </a:r>
+            <a:r>
+              <a:rPr lang="en-US" sz="1400" i="1" noProof="1" smtClean="0"/>
+              <a:t>– </a:t>
+            </a:r>
+            <a:r>
+              <a:rPr lang="en-US" sz="1600" i="1" noProof="1" smtClean="0"/>
+              <a:t>seteaza </a:t>
+            </a:r>
+            <a:r>
+              <a:rPr lang="en-US" sz="1600" i="1" noProof="1" smtClean="0"/>
+              <a:t>ce </a:t>
+            </a:r>
+            <a:r>
+              <a:rPr lang="en-US" sz="1600" i="1" noProof="1" smtClean="0"/>
+              <a:t>grad de umiditate va corespunde carei parcele (Ex. : parcela A va fi de gradul 3 umiditate) =&gt; </a:t>
+            </a:r>
+            <a:r>
+              <a:rPr lang="en-US" sz="1600" noProof="1" smtClean="0"/>
+              <a:t>Table Insert</a:t>
+            </a:r>
           </a:p>
           <a:p>
             <a:pPr marL="285750" indent="-285750">
@@ -6341,86 +7555,25 @@
               <a:buChar char="-"/>
             </a:pPr>
             <a:r>
-              <a:rPr lang="en-US" sz="1600" b="1" dirty="0" err="1" smtClean="0"/>
-              <a:t>StopIrigation</a:t>
-            </a:r>
-            <a:r>
-              <a:rPr lang="en-US" sz="1600" b="1" dirty="0" smtClean="0"/>
-              <a:t>(area) – </a:t>
-            </a:r>
-            <a:r>
-              <a:rPr lang="en-US" sz="1400" i="1" dirty="0" smtClean="0"/>
-              <a:t>da </a:t>
-            </a:r>
-            <a:r>
-              <a:rPr lang="en-US" sz="1400" i="1" dirty="0" err="1" smtClean="0"/>
-              <a:t>comanda</a:t>
-            </a:r>
-            <a:r>
-              <a:rPr lang="en-US" sz="1400" i="1" dirty="0" smtClean="0"/>
-              <a:t> </a:t>
-            </a:r>
-            <a:r>
-              <a:rPr lang="en-US" sz="1400" i="1" dirty="0" err="1" smtClean="0"/>
-              <a:t>pentru</a:t>
-            </a:r>
-            <a:r>
-              <a:rPr lang="en-US" sz="1400" i="1" dirty="0" smtClean="0"/>
-              <a:t> a </a:t>
-            </a:r>
-            <a:r>
-              <a:rPr lang="en-US" sz="1400" i="1" dirty="0" err="1" smtClean="0"/>
-              <a:t>opri</a:t>
-            </a:r>
-            <a:r>
-              <a:rPr lang="en-US" sz="1400" i="1" dirty="0" smtClean="0"/>
-              <a:t> </a:t>
-            </a:r>
-            <a:r>
-              <a:rPr lang="en-US" sz="1400" i="1" dirty="0" err="1" smtClean="0"/>
-              <a:t>irigarea</a:t>
-            </a:r>
-            <a:r>
-              <a:rPr lang="en-US" sz="1400" i="1" dirty="0" smtClean="0"/>
-              <a:t> </a:t>
-            </a:r>
-            <a:r>
-              <a:rPr lang="en-US" sz="1400" i="1" dirty="0" err="1" smtClean="0"/>
-              <a:t>unei</a:t>
-            </a:r>
-            <a:r>
-              <a:rPr lang="en-US" sz="1400" i="1" dirty="0" smtClean="0"/>
-              <a:t> zone </a:t>
-            </a:r>
-            <a:r>
-              <a:rPr lang="en-US" sz="1400" i="1" dirty="0" err="1"/>
-              <a:t>pana</a:t>
-            </a:r>
-            <a:r>
-              <a:rPr lang="en-US" sz="1400" i="1" dirty="0"/>
-              <a:t> se </a:t>
-            </a:r>
-            <a:r>
-              <a:rPr lang="en-US" sz="1400" i="1" dirty="0" err="1"/>
-              <a:t>indeplinesc</a:t>
-            </a:r>
-            <a:r>
-              <a:rPr lang="en-US" sz="1400" i="1" dirty="0"/>
-              <a:t> </a:t>
-            </a:r>
-            <a:r>
-              <a:rPr lang="en-US" sz="1400" i="1" dirty="0" err="1"/>
-              <a:t>anumite</a:t>
-            </a:r>
-            <a:r>
-              <a:rPr lang="en-US" sz="1400" i="1" dirty="0"/>
-              <a:t> </a:t>
-            </a:r>
-            <a:r>
-              <a:rPr lang="en-US" sz="1400" i="1" dirty="0" err="1" smtClean="0"/>
-              <a:t>conditii</a:t>
-            </a:r>
-            <a:endParaRPr lang="en-US" sz="1600" b="1" dirty="0"/>
+              <a:rPr lang="en-US" sz="1600" b="1" noProof="1" smtClean="0"/>
+              <a:t>UpdateHumidityFlag() </a:t>
+            </a:r>
+            <a:r>
+              <a:rPr lang="en-US" sz="1400" i="1" noProof="1"/>
+              <a:t>– </a:t>
+            </a:r>
+            <a:r>
+              <a:rPr lang="en-US" sz="1600" i="1" noProof="1"/>
+              <a:t>updateaza ce grad de umiditate va corespunde </a:t>
+            </a:r>
+            <a:r>
+              <a:rPr lang="en-US" sz="1600" i="1" noProof="1"/>
+              <a:t>carei </a:t>
+            </a:r>
+            <a:r>
+              <a:rPr lang="en-US" sz="1600" i="1" noProof="1" smtClean="0"/>
+              <a:t>parcele</a:t>
+            </a:r>
           </a:p>
           <a:p>
             <a:pPr marL="285750" indent="-285750">
@@ -6434,56 +7587,39 @@
               <a:buChar char="-"/>
             </a:pPr>
             <a:r>
-              <a:rPr lang="en-US" sz="1100" b="1" dirty="0" smtClean="0"/>
-              <a:t>//</a:t>
-            </a:r>
-            <a:r>
-              <a:rPr lang="en-US" sz="1100" b="1" dirty="0" err="1" smtClean="0"/>
-              <a:t>DelimitAreas</a:t>
-            </a:r>
-            <a:r>
-              <a:rPr lang="en-US" sz="1100" b="1" dirty="0"/>
+              <a:rPr lang="en-US" sz="1600" b="1" noProof="1"/>
+              <a:t>DisplayHumidityFlags</a:t>
+            </a:r>
+            <a:r>
+              <a:rPr lang="en-US" sz="1600" b="1" noProof="1"/>
               <a:t>() </a:t>
             </a:r>
             <a:r>
-              <a:rPr lang="en-US" sz="1100" dirty="0" smtClean="0"/>
+              <a:rPr lang="en-US" sz="1600" b="1" noProof="1" smtClean="0"/>
               <a:t>– </a:t>
             </a:r>
             <a:r>
-              <a:rPr lang="en-US" sz="1100" i="1" dirty="0" smtClean="0"/>
-              <a:t>draw areas on Google Map – </a:t>
-            </a:r>
-            <a:r>
-              <a:rPr lang="en-US" sz="1100" i="1" dirty="0" err="1" smtClean="0"/>
-              <a:t>traseaza</a:t>
-            </a:r>
-            <a:r>
-              <a:rPr lang="en-US" sz="1100" i="1" dirty="0" smtClean="0"/>
-              <a:t>/</a:t>
-            </a:r>
-            <a:r>
-              <a:rPr lang="en-US" sz="1100" i="1" dirty="0" err="1" smtClean="0"/>
-              <a:t>sterge</a:t>
-            </a:r>
-            <a:r>
-              <a:rPr lang="en-US" sz="1100" i="1" dirty="0" smtClean="0"/>
-              <a:t>, </a:t>
-            </a:r>
-            <a:r>
-              <a:rPr lang="en-US" sz="1100" i="1" dirty="0" err="1" smtClean="0"/>
-              <a:t>modifica</a:t>
-            </a:r>
-            <a:r>
-              <a:rPr lang="en-US" sz="1100" i="1" dirty="0" smtClean="0"/>
-              <a:t> </a:t>
-            </a:r>
-            <a:r>
-              <a:rPr lang="en-US" sz="1100" i="1" dirty="0" err="1" smtClean="0"/>
-              <a:t>zonele</a:t>
-            </a:r>
-            <a:r>
-              <a:rPr lang="en-US" sz="1100" i="1" dirty="0" smtClean="0"/>
-              <a:t> in Google Maps</a:t>
+              <a:rPr lang="en-US" sz="1600" i="1" noProof="1" smtClean="0"/>
+              <a:t>afiseaza ce grad de umiditate corespunde carei parcele. </a:t>
+            </a:r>
+            <a:endParaRPr lang="en-US" sz="1600" b="1" noProof="1"/>
+          </a:p>
+          <a:p>
+            <a:pPr marL="285750" indent="-285750">
+              <a:buFontTx/>
+              <a:buChar char="-"/>
+            </a:pPr>
+            <a:r>
+              <a:rPr lang="en-US" sz="1000" b="1" strike="sngStrike" noProof="1" smtClean="0"/>
+              <a:t>SetHumidityIntervals/Domain</a:t>
+            </a:r>
+            <a:r>
+              <a:rPr lang="en-US" sz="1000" b="1" strike="sngStrike" noProof="1" smtClean="0"/>
+              <a:t>() </a:t>
+            </a:r>
+            <a:r>
+              <a:rPr lang="en-US" sz="1000" i="1" strike="sngStrike" noProof="1" smtClean="0"/>
+              <a:t>– seteaza valorile intre care solul este uscat, umed si suprasaturat. (intre value x si y =&gt; sol uscat, umed sau suprasaturat)</a:t>
             </a:r>
           </a:p>
           <a:p>
@@ -6498,38 +7634,22 @@
               <a:buChar char="-"/>
             </a:pPr>
             <a:r>
-              <a:rPr lang="en-US" sz="1100" b="1" dirty="0" smtClean="0"/>
-              <a:t>//</a:t>
-            </a:r>
-            <a:r>
-              <a:rPr lang="en-US" sz="1100" b="1" dirty="0" err="1" smtClean="0"/>
-              <a:t>EraseArea</a:t>
-            </a:r>
-            <a:r>
-              <a:rPr lang="en-US" sz="1100" b="1" dirty="0" smtClean="0"/>
-              <a:t>() – </a:t>
-            </a:r>
-            <a:r>
-              <a:rPr lang="en-US" sz="1100" i="1" dirty="0" err="1" smtClean="0"/>
-              <a:t>sterge</a:t>
-            </a:r>
-            <a:r>
-              <a:rPr lang="en-US" sz="1100" i="1" dirty="0" smtClean="0"/>
-              <a:t> o zona din Google Maps ca </a:t>
-            </a:r>
-            <a:r>
-              <a:rPr lang="en-US" sz="1100" i="1" dirty="0" err="1" smtClean="0"/>
-              <a:t>fiind</a:t>
-            </a:r>
-            <a:r>
-              <a:rPr lang="en-US" sz="1100" i="1" dirty="0" smtClean="0"/>
-              <a:t> de </a:t>
-            </a:r>
-            <a:r>
-              <a:rPr lang="en-US" sz="1100" i="1" dirty="0" err="1" smtClean="0"/>
-              <a:t>interes</a:t>
-            </a:r>
-            <a:endParaRPr lang="en-US" sz="1100" b="1" dirty="0"/>
+              <a:rPr lang="en-US" sz="1000" b="1" strike="sngStrike" noProof="1" smtClean="0"/>
+              <a:t>Irrigate(</a:t>
+            </a:r>
+            <a:r>
+              <a:rPr lang="en-US" sz="1000" b="1" i="1" strike="sngStrike" noProof="1" smtClean="0"/>
+              <a:t>area</a:t>
+            </a:r>
+            <a:r>
+              <a:rPr lang="en-US" sz="1000" b="1" strike="sngStrike" noProof="1" smtClean="0"/>
+              <a:t>) – </a:t>
+            </a:r>
+            <a:r>
+              <a:rPr lang="en-US" sz="1000" i="1" strike="sngStrike" noProof="1" smtClean="0"/>
+              <a:t>da comanda pentru a iriga o anumita zona pana se indeplinesc anumite conditii</a:t>
+            </a:r>
+            <a:endParaRPr lang="en-US" sz="1000" b="1" i="1" strike="sngStrike" noProof="1" smtClean="0"/>
           </a:p>
           <a:p>
             <a:pPr marL="285750" indent="-285750">
@@ -6543,42 +7663,14 @@
               <a:buChar char="-"/>
             </a:pPr>
             <a:r>
-              <a:rPr lang="en-US" sz="1100" b="1" dirty="0" smtClean="0"/>
-              <a:t>//</a:t>
-            </a:r>
-            <a:r>
-              <a:rPr lang="en-US" sz="1100" b="1" dirty="0" err="1" smtClean="0"/>
-              <a:t>AddArea</a:t>
-            </a:r>
-            <a:r>
-              <a:rPr lang="en-US" sz="1100" b="1" dirty="0" smtClean="0"/>
-              <a:t>() – </a:t>
-            </a:r>
-            <a:r>
-              <a:rPr lang="en-US" sz="1100" i="1" dirty="0" err="1" smtClean="0"/>
-              <a:t>adauga</a:t>
-            </a:r>
-            <a:r>
-              <a:rPr lang="en-US" sz="1100" i="1" dirty="0" smtClean="0"/>
-              <a:t> o </a:t>
-            </a:r>
-            <a:r>
-              <a:rPr lang="en-US" sz="1100" i="1" dirty="0"/>
-              <a:t>zona din Google Maps ca </a:t>
-            </a:r>
-            <a:r>
-              <a:rPr lang="en-US" sz="1100" i="1" dirty="0" err="1"/>
-              <a:t>fiind</a:t>
-            </a:r>
-            <a:r>
-              <a:rPr lang="en-US" sz="1100" i="1" dirty="0"/>
-              <a:t> de </a:t>
-            </a:r>
-            <a:r>
-              <a:rPr lang="en-US" sz="1100" i="1" dirty="0" err="1" smtClean="0"/>
-              <a:t>interes</a:t>
-            </a:r>
-            <a:endParaRPr lang="en-US" sz="1100" b="1" dirty="0"/>
+              <a:rPr lang="en-US" sz="1000" b="1" strike="sngStrike" noProof="1" smtClean="0"/>
+              <a:t>StopIrigation(area) – </a:t>
+            </a:r>
+            <a:r>
+              <a:rPr lang="en-US" sz="1000" i="1" strike="sngStrike" noProof="1" smtClean="0"/>
+              <a:t>da comanda pentru a opri irigarea unei zone pana se indeplinesc anumite conditii</a:t>
+            </a:r>
+            <a:endParaRPr lang="en-US" sz="1000" b="1" strike="sngStrike" noProof="1" smtClean="0"/>
           </a:p>
           <a:p>
             <a:pPr marL="285750" indent="-285750">
@@ -6592,46 +7684,17 @@
               <a:buChar char="-"/>
             </a:pPr>
             <a:r>
-              <a:rPr lang="en-US" sz="1100" b="1" dirty="0" smtClean="0"/>
-              <a:t>//</a:t>
-            </a:r>
-            <a:r>
-              <a:rPr lang="en-US" sz="1100" b="1" dirty="0" err="1" smtClean="0"/>
-              <a:t>UpdateArea</a:t>
-            </a:r>
-            <a:r>
-              <a:rPr lang="en-US" sz="1100" b="1" dirty="0" smtClean="0"/>
-              <a:t>() </a:t>
-            </a:r>
-            <a:r>
-              <a:rPr lang="en-US" sz="1100" i="1" dirty="0" smtClean="0"/>
+              <a:rPr lang="en-US" sz="1000" b="1" strike="sngStrike" noProof="1" smtClean="0"/>
+              <a:t>//DelimitAreas() </a:t>
+            </a:r>
+            <a:r>
+              <a:rPr lang="en-US" sz="1000" strike="sngStrike" noProof="1" smtClean="0"/>
               <a:t>– </a:t>
             </a:r>
             <a:r>
-              <a:rPr lang="en-US" sz="1100" i="1" dirty="0" err="1" smtClean="0"/>
-              <a:t>modifica</a:t>
-            </a:r>
-            <a:r>
-              <a:rPr lang="en-US" sz="1100" i="1" dirty="0" smtClean="0"/>
-              <a:t> o </a:t>
-            </a:r>
-            <a:r>
-              <a:rPr lang="en-US" sz="1100" i="1" dirty="0"/>
-              <a:t>zona din Google Maps ca </a:t>
-            </a:r>
-            <a:r>
-              <a:rPr lang="en-US" sz="1100" i="1" dirty="0" err="1"/>
-              <a:t>fiind</a:t>
-            </a:r>
-            <a:r>
-              <a:rPr lang="en-US" sz="1100" i="1" dirty="0"/>
-              <a:t> de </a:t>
-            </a:r>
-            <a:r>
-              <a:rPr lang="en-US" sz="1100" i="1" dirty="0" err="1"/>
-              <a:t>interes</a:t>
-            </a:r>
-            <a:endParaRPr lang="en-US" sz="1100" i="1" dirty="0"/>
+              <a:rPr lang="en-US" sz="1000" i="1" strike="sngStrike" noProof="1" smtClean="0"/>
+              <a:t>draw areas on Google Map – traseaza/sterge, modifica zonele in Google Maps</a:t>
+            </a:r>
           </a:p>
           <a:p>
             <a:pPr marL="285750" indent="-285750">
@@ -6644,7 +7707,69 @@
               <a:buFontTx/>
               <a:buChar char="-"/>
             </a:pPr>
-            <a:endParaRPr lang="en-US" sz="1600" b="1" dirty="0"/>
+            <a:r>
+              <a:rPr lang="en-US" sz="1000" b="1" strike="sngStrike" noProof="1" smtClean="0"/>
+              <a:t>//EraseArea() – </a:t>
+            </a:r>
+            <a:r>
+              <a:rPr lang="en-US" sz="1000" i="1" strike="sngStrike" noProof="1" smtClean="0"/>
+              <a:t>sterge o zona din Google Maps ca fiind de interes</a:t>
+            </a:r>
+            <a:endParaRPr lang="en-US" sz="1000" b="1" strike="sngStrike" noProof="1" smtClean="0"/>
+          </a:p>
+          <a:p>
+            <a:pPr marL="285750" indent="-285750">
+              <a:spcBef>
+                <a:spcPts val="600"/>
+              </a:spcBef>
+              <a:spcAft>
+                <a:spcPts val="600"/>
+              </a:spcAft>
+              <a:buFontTx/>
+              <a:buChar char="-"/>
+            </a:pPr>
+            <a:r>
+              <a:rPr lang="en-US" sz="1000" b="1" strike="sngStrike" noProof="1" smtClean="0"/>
+              <a:t>//AddArea() – </a:t>
+            </a:r>
+            <a:r>
+              <a:rPr lang="en-US" sz="1000" i="1" strike="sngStrike" noProof="1" smtClean="0"/>
+              <a:t>adauga o zona din Google Maps ca fiind de interes</a:t>
+            </a:r>
+            <a:endParaRPr lang="en-US" sz="1000" b="1" strike="sngStrike" noProof="1" smtClean="0"/>
+          </a:p>
+          <a:p>
+            <a:pPr marL="285750" indent="-285750">
+              <a:spcBef>
+                <a:spcPts val="600"/>
+              </a:spcBef>
+              <a:spcAft>
+                <a:spcPts val="600"/>
+              </a:spcAft>
+              <a:buFontTx/>
+              <a:buChar char="-"/>
+            </a:pPr>
+            <a:r>
+              <a:rPr lang="en-US" sz="1000" b="1" strike="sngStrike" noProof="1" smtClean="0"/>
+              <a:t>//UpdateArea() </a:t>
+            </a:r>
+            <a:r>
+              <a:rPr lang="en-US" sz="1000" i="1" strike="sngStrike" noProof="1" smtClean="0"/>
+              <a:t>– modifica o zona din Google Maps ca fiind de interes</a:t>
+            </a:r>
+          </a:p>
+          <a:p>
+            <a:pPr marL="285750" indent="-285750">
+              <a:spcBef>
+                <a:spcPts val="600"/>
+              </a:spcBef>
+              <a:spcAft>
+                <a:spcPts val="600"/>
+              </a:spcAft>
+              <a:buFontTx/>
+              <a:buChar char="-"/>
+            </a:pPr>
+            <a:endParaRPr lang="en-US" sz="1600" b="1" noProof="1"/>
           </a:p>
         </p:txBody>
       </p:sp>
@@ -6668,7 +7793,7 @@
 </p:sld>
 </file>
 
-<file path=ppt/slides/slide6.xml><?xml version="1.0" encoding="utf-8"?>
+<file path=ppt/slides/slide9.xml><?xml version="1.0" encoding="utf-8"?>
 <p:sld xmlns:a="http://schemas.openxmlformats.org/drawingml/2006/main" xmlns:r="http://schemas.openxmlformats.org/officeDocument/2006/relationships" xmlns:p="http://schemas.openxmlformats.org/presentationml/2006/main">
   <p:cSld>
     <p:spTree>
@@ -6716,12 +7841,8 @@
               </a:spcAft>
             </a:pPr>
             <a:r>
-              <a:rPr lang="en-US" sz="2000" b="1" dirty="0" err="1" smtClean="0"/>
-              <a:t>Generare</a:t>
-            </a:r>
-            <a:r>
-              <a:rPr lang="en-US" sz="2000" b="1" dirty="0" smtClean="0"/>
-              <a:t> Date:</a:t>
+              <a:rPr lang="en-US" sz="2000" b="1" noProof="1" smtClean="0"/>
+              <a:t>Generare Date:</a:t>
             </a:r>
           </a:p>
           <a:p>
@@ -6734,130 +7855,26 @@
               </a:spcAft>
             </a:pPr>
             <a:r>
-              <a:rPr lang="en-US" dirty="0" smtClean="0"/>
+              <a:rPr lang="en-US" noProof="1" smtClean="0"/>
               <a:t>- </a:t>
             </a:r>
             <a:r>
-              <a:rPr lang="en-US" b="1" dirty="0" err="1" smtClean="0"/>
-              <a:t>GenerateRandom</a:t>
-            </a:r>
-            <a:r>
-              <a:rPr lang="en-US" b="1" dirty="0" smtClean="0"/>
-              <a:t> </a:t>
-            </a:r>
-            <a:r>
-              <a:rPr lang="en-US" b="1" i="1" dirty="0" smtClean="0"/>
-              <a:t>(</a:t>
-            </a:r>
-            <a:r>
-              <a:rPr lang="en-US" b="1" i="1" dirty="0" err="1" smtClean="0"/>
-              <a:t>minVal,maxVal</a:t>
-            </a:r>
-            <a:r>
-              <a:rPr lang="en-US" b="1" i="1" dirty="0" smtClean="0"/>
-              <a:t>) </a:t>
-            </a:r>
-            <a:r>
-              <a:rPr lang="en-US" sz="1600" i="1" dirty="0" smtClean="0"/>
-              <a:t>– </a:t>
-            </a:r>
-            <a:r>
-              <a:rPr lang="en-US" sz="1600" i="1" dirty="0" err="1" smtClean="0"/>
-              <a:t>genereaza</a:t>
-            </a:r>
-            <a:r>
-              <a:rPr lang="en-US" sz="1600" i="1" dirty="0" smtClean="0"/>
-              <a:t> date random </a:t>
-            </a:r>
-            <a:r>
-              <a:rPr lang="en-US" sz="1600" i="1" dirty="0" err="1" smtClean="0"/>
-              <a:t>ce</a:t>
-            </a:r>
-            <a:r>
-              <a:rPr lang="en-US" sz="1600" i="1" dirty="0" smtClean="0"/>
-              <a:t> </a:t>
-            </a:r>
-            <a:r>
-              <a:rPr lang="en-US" sz="1600" i="1" dirty="0" err="1" smtClean="0"/>
-              <a:t>reprezinta</a:t>
-            </a:r>
-            <a:r>
-              <a:rPr lang="en-US" sz="1600" i="1" dirty="0" smtClean="0"/>
-              <a:t> </a:t>
-            </a:r>
-            <a:r>
-              <a:rPr lang="en-US" sz="1600" i="1" dirty="0" err="1" smtClean="0"/>
-              <a:t>starea</a:t>
-            </a:r>
-            <a:r>
-              <a:rPr lang="en-US" sz="1600" i="1" dirty="0" smtClean="0"/>
-              <a:t> de </a:t>
-            </a:r>
-            <a:r>
-              <a:rPr lang="en-US" sz="1600" i="1" dirty="0" err="1" smtClean="0"/>
-              <a:t>umiditate</a:t>
-            </a:r>
-            <a:r>
-              <a:rPr lang="en-US" sz="1600" i="1" dirty="0" smtClean="0"/>
-              <a:t>, </a:t>
-            </a:r>
-            <a:r>
-              <a:rPr lang="en-US" sz="1600" i="1" dirty="0" err="1" smtClean="0"/>
-              <a:t>dand</a:t>
-            </a:r>
-            <a:r>
-              <a:rPr lang="en-US" sz="1600" i="1" dirty="0" smtClean="0"/>
-              <a:t> un interval de </a:t>
-            </a:r>
-            <a:r>
-              <a:rPr lang="en-US" sz="1600" i="1" dirty="0" err="1" smtClean="0"/>
-              <a:t>valori</a:t>
-            </a:r>
-            <a:r>
-              <a:rPr lang="en-US" sz="1600" i="1" dirty="0" smtClean="0"/>
-              <a:t> </a:t>
-            </a:r>
-            <a:r>
-              <a:rPr lang="en-US" sz="1600" i="1" dirty="0" err="1" smtClean="0"/>
-              <a:t>posibile</a:t>
-            </a:r>
-            <a:r>
-              <a:rPr lang="en-US" sz="1600" i="1" dirty="0" smtClean="0"/>
-              <a:t> </a:t>
-            </a:r>
-            <a:r>
-              <a:rPr lang="en-US" sz="1600" i="1" dirty="0" err="1" smtClean="0"/>
-              <a:t>pentru</a:t>
-            </a:r>
-            <a:r>
-              <a:rPr lang="en-US" sz="1600" i="1" dirty="0" smtClean="0"/>
-              <a:t> a </a:t>
-            </a:r>
-            <a:r>
-              <a:rPr lang="en-US" sz="1600" i="1" dirty="0" err="1" smtClean="0"/>
-              <a:t>putea</a:t>
-            </a:r>
-            <a:r>
-              <a:rPr lang="en-US" sz="1600" i="1" dirty="0" smtClean="0"/>
-              <a:t> fi </a:t>
-            </a:r>
-            <a:r>
-              <a:rPr lang="en-US" sz="1600" i="1" dirty="0" err="1" smtClean="0"/>
-              <a:t>interpretate</a:t>
-            </a:r>
-            <a:r>
-              <a:rPr lang="en-US" sz="1600" i="1" dirty="0" smtClean="0"/>
-              <a:t> in </a:t>
-            </a:r>
-            <a:r>
-              <a:rPr lang="en-US" sz="1600" b="1" i="1" dirty="0" err="1" smtClean="0"/>
-              <a:t>CheckHumidityTresholds</a:t>
-            </a:r>
-            <a:r>
-              <a:rPr lang="en-US" sz="1600" b="1" i="1" dirty="0" smtClean="0"/>
-              <a:t>()</a:t>
-            </a:r>
-            <a:endParaRPr lang="en-US" sz="1600" i="1" dirty="0" smtClean="0"/>
+              <a:rPr lang="en-US" b="1" noProof="1" smtClean="0"/>
+              <a:t>GenerateRandom </a:t>
+            </a:r>
+            <a:r>
+              <a:rPr lang="en-US" b="1" i="1" noProof="1" smtClean="0"/>
+              <a:t>(minVal,maxVal) </a:t>
+            </a:r>
+            <a:r>
+              <a:rPr lang="en-US" sz="1600" i="1" noProof="1" smtClean="0"/>
+              <a:t>– genereaza date random ce reprezinta starea de umiditate, dand un interval de valori posibile pentru a putea fi interpretate in </a:t>
+            </a:r>
+            <a:r>
+              <a:rPr lang="en-US" sz="1600" b="1" i="1" noProof="1" smtClean="0"/>
+              <a:t>CheckHumidityTresholds()</a:t>
+            </a:r>
+            <a:endParaRPr lang="en-US" sz="1600" i="1" noProof="1" smtClean="0"/>
           </a:p>
           <a:p>
             <a:pPr marL="285750" indent="-285750">
@@ -6871,84 +7888,16 @@
               <a:buChar char="-"/>
             </a:pPr>
             <a:r>
-              <a:rPr lang="en-US" b="1" dirty="0" err="1" smtClean="0"/>
-              <a:t>UploadValues</a:t>
-            </a:r>
-            <a:r>
-              <a:rPr lang="en-US" b="1" dirty="0" smtClean="0"/>
-              <a:t>() </a:t>
-            </a:r>
-            <a:r>
-              <a:rPr lang="en-US" sz="1600" dirty="0" smtClean="0"/>
+              <a:rPr lang="en-US" b="1" noProof="1" smtClean="0"/>
+              <a:t>UploadValues() </a:t>
+            </a:r>
+            <a:r>
+              <a:rPr lang="en-US" sz="1600" noProof="1" smtClean="0"/>
               <a:t>– </a:t>
             </a:r>
             <a:r>
-              <a:rPr lang="en-US" sz="1600" i="1" dirty="0" smtClean="0"/>
-              <a:t>upload-</a:t>
-            </a:r>
-            <a:r>
-              <a:rPr lang="en-US" sz="1600" i="1" dirty="0" err="1" smtClean="0"/>
-              <a:t>eaza</a:t>
-            </a:r>
-            <a:r>
-              <a:rPr lang="en-US" sz="1600" i="1" dirty="0" smtClean="0"/>
-              <a:t> </a:t>
-            </a:r>
-            <a:r>
-              <a:rPr lang="en-US" sz="1600" i="1" dirty="0" err="1" smtClean="0"/>
-              <a:t>valorile</a:t>
-            </a:r>
-            <a:r>
-              <a:rPr lang="en-US" sz="1600" i="1" dirty="0" smtClean="0"/>
-              <a:t> generate </a:t>
-            </a:r>
-            <a:r>
-              <a:rPr lang="en-US" sz="1600" i="1" dirty="0" err="1" smtClean="0"/>
-              <a:t>intr</a:t>
-            </a:r>
-            <a:r>
-              <a:rPr lang="en-US" sz="1600" i="1" dirty="0" smtClean="0"/>
-              <a:t>-o </a:t>
-            </a:r>
-            <a:r>
-              <a:rPr lang="en-US" sz="1600" i="1" dirty="0" err="1" smtClean="0"/>
-              <a:t>baza</a:t>
-            </a:r>
-            <a:r>
-              <a:rPr lang="en-US" sz="1600" i="1" dirty="0" smtClean="0"/>
-              <a:t> de date, de </a:t>
-            </a:r>
-            <a:r>
-              <a:rPr lang="en-US" sz="1600" i="1" dirty="0" err="1" smtClean="0"/>
-              <a:t>unde</a:t>
-            </a:r>
-            <a:r>
-              <a:rPr lang="en-US" sz="1600" i="1" dirty="0" smtClean="0"/>
-              <a:t> </a:t>
-            </a:r>
-            <a:r>
-              <a:rPr lang="en-US" sz="1600" i="1" dirty="0" err="1" smtClean="0"/>
-              <a:t>vor</a:t>
-            </a:r>
-            <a:r>
-              <a:rPr lang="en-US" sz="1600" i="1" dirty="0" smtClean="0"/>
-              <a:t> fi </a:t>
-            </a:r>
-            <a:r>
-              <a:rPr lang="en-US" sz="1600" i="1" dirty="0" err="1" smtClean="0"/>
-              <a:t>colectate</a:t>
-            </a:r>
-            <a:r>
-              <a:rPr lang="en-US" sz="1600" i="1" dirty="0" smtClean="0"/>
-              <a:t> de </a:t>
-            </a:r>
-            <a:r>
-              <a:rPr lang="en-US" sz="1600" i="1" dirty="0" err="1" smtClean="0"/>
-              <a:t>catre</a:t>
-            </a:r>
-            <a:r>
-              <a:rPr lang="en-US" sz="1600" i="1" dirty="0" smtClean="0"/>
-              <a:t> Background Worker</a:t>
+              <a:rPr lang="en-US" sz="1600" i="1" noProof="1" smtClean="0"/>
+              <a:t>upload-eaza valorile generate intr-o baza de date, de unde vor fi colectate de catre Background Worker</a:t>
             </a:r>
           </a:p>
           <a:p>
@@ -6962,7 +7911,7 @@
               <a:buFontTx/>
               <a:buChar char="-"/>
             </a:pPr>
-            <a:endParaRPr lang="en-US" sz="1600" i="1" dirty="0"/>
+            <a:endParaRPr lang="en-US" sz="1600" i="1" noProof="1" smtClean="0"/>
           </a:p>
           <a:p>
             <a:pPr>
@@ -6974,86 +7923,17 @@
               </a:spcAft>
             </a:pPr>
             <a:r>
-              <a:rPr lang="en-US" b="1" i="1" dirty="0" err="1" smtClean="0"/>
+              <a:rPr lang="en-US" b="1" i="1" noProof="1" smtClean="0"/>
               <a:t>Realizare</a:t>
             </a:r>
             <a:r>
-              <a:rPr lang="en-US" sz="1600" i="1" dirty="0" smtClean="0"/>
+              <a:rPr lang="en-US" sz="1600" i="1" noProof="1" smtClean="0"/>
               <a:t> : </a:t>
             </a:r>
             <a:r>
-              <a:rPr lang="en-US" sz="1600" b="1" dirty="0" err="1"/>
-              <a:t>Prin</a:t>
-            </a:r>
-            <a:r>
-              <a:rPr lang="en-US" sz="1600" b="1" dirty="0"/>
-              <a:t> http pooling – se </a:t>
-            </a:r>
-            <a:r>
-              <a:rPr lang="en-US" sz="1600" b="1" dirty="0" err="1"/>
-              <a:t>iau</a:t>
-            </a:r>
-            <a:r>
-              <a:rPr lang="en-US" sz="1600" b="1" dirty="0"/>
-              <a:t> </a:t>
-            </a:r>
-            <a:r>
-              <a:rPr lang="en-US" sz="1600" b="1" dirty="0" err="1"/>
-              <a:t>datele</a:t>
-            </a:r>
-            <a:r>
-              <a:rPr lang="en-US" sz="1600" b="1" dirty="0"/>
-              <a:t> din </a:t>
-            </a:r>
-            <a:r>
-              <a:rPr lang="en-US" sz="1600" b="1" dirty="0" err="1"/>
-              <a:t>baza</a:t>
-            </a:r>
-            <a:r>
-              <a:rPr lang="en-US" sz="1600" b="1" dirty="0"/>
-              <a:t> de date </a:t>
-            </a:r>
-            <a:r>
-              <a:rPr lang="en-US" sz="1600" b="1" dirty="0" smtClean="0"/>
-              <a:t>– </a:t>
-            </a:r>
-            <a:r>
-              <a:rPr lang="en-US" sz="1600" b="1" dirty="0" err="1" smtClean="0"/>
-              <a:t>despre</a:t>
-            </a:r>
-            <a:r>
-              <a:rPr lang="en-US" sz="1600" b="1" dirty="0" smtClean="0"/>
-              <a:t> </a:t>
-            </a:r>
-            <a:r>
-              <a:rPr lang="en-US" sz="1600" b="1" dirty="0" err="1"/>
-              <a:t>starea</a:t>
-            </a:r>
-            <a:r>
-              <a:rPr lang="en-US" sz="1600" b="1" dirty="0"/>
-              <a:t> </a:t>
-            </a:r>
-            <a:r>
-              <a:rPr lang="en-US" sz="1600" b="1" dirty="0" err="1"/>
-              <a:t>pompelor</a:t>
-            </a:r>
-            <a:r>
-              <a:rPr lang="en-US" sz="1600" b="1" dirty="0"/>
-              <a:t> </a:t>
-            </a:r>
-            <a:r>
-              <a:rPr lang="en-US" sz="1600" b="1" dirty="0" err="1"/>
-              <a:t>si</a:t>
-            </a:r>
-            <a:r>
-              <a:rPr lang="en-US" sz="1600" b="1" dirty="0"/>
-              <a:t> a </a:t>
-            </a:r>
-            <a:r>
-              <a:rPr lang="en-US" sz="1600" b="1" dirty="0" err="1"/>
-              <a:t>datelor</a:t>
-            </a:r>
-            <a:endParaRPr lang="en-US" sz="1600" b="1" dirty="0"/>
+              <a:rPr lang="en-US" sz="1600" b="1" noProof="1" smtClean="0"/>
+              <a:t>Prin http pooling – se iau datele din baza de date – despre starea pompelor si a datelor</a:t>
+            </a:r>
           </a:p>
           <a:p>
             <a:pPr>
@@ -7064,7 +7944,7 @@
                 <a:spcPts val="600"/>
               </a:spcAft>
             </a:pPr>
-            <a:endParaRPr lang="en-US" sz="1600" i="1" dirty="0"/>
+            <a:endParaRPr lang="en-US" sz="1600" i="1" noProof="1"/>
           </a:p>
         </p:txBody>
       </p:sp>

</xml_diff>